<commit_message>
adding network and starting with storage. Volumes are ready binds are not.
</commit_message>
<xml_diff>
--- a/Docker presentation.pptx
+++ b/Docker presentation.pptx
@@ -30,6 +30,12 @@
     <p:sldId id="278" r:id="rId24"/>
     <p:sldId id="279" r:id="rId25"/>
     <p:sldId id="280" r:id="rId26"/>
+    <p:sldId id="281" r:id="rId27"/>
+    <p:sldId id="282" r:id="rId28"/>
+    <p:sldId id="283" r:id="rId29"/>
+    <p:sldId id="284" r:id="rId30"/>
+    <p:sldId id="286" r:id="rId31"/>
+    <p:sldId id="285" r:id="rId32"/>
   </p:sldIdLst>
   <p:sldSz cx="12192000" cy="6858000"/>
   <p:notesSz cx="6858000" cy="9144000"/>
@@ -283,7 +289,7 @@
           <a:p>
             <a:fld id="{88B6F594-2319-384E-B338-97933ED39875}" type="datetimeFigureOut">
               <a:rPr lang="en-US" smtClean="0"/>
-              <a:t>3/7/18</a:t>
+              <a:t>3/12/18</a:t>
             </a:fld>
             <a:endParaRPr lang="en-US"/>
           </a:p>
@@ -481,7 +487,7 @@
           <a:p>
             <a:fld id="{88B6F594-2319-384E-B338-97933ED39875}" type="datetimeFigureOut">
               <a:rPr lang="en-US" smtClean="0"/>
-              <a:t>3/7/18</a:t>
+              <a:t>3/12/18</a:t>
             </a:fld>
             <a:endParaRPr lang="en-US"/>
           </a:p>
@@ -689,7 +695,7 @@
           <a:p>
             <a:fld id="{88B6F594-2319-384E-B338-97933ED39875}" type="datetimeFigureOut">
               <a:rPr lang="en-US" smtClean="0"/>
-              <a:t>3/7/18</a:t>
+              <a:t>3/12/18</a:t>
             </a:fld>
             <a:endParaRPr lang="en-US"/>
           </a:p>
@@ -887,7 +893,7 @@
           <a:p>
             <a:fld id="{88B6F594-2319-384E-B338-97933ED39875}" type="datetimeFigureOut">
               <a:rPr lang="en-US" smtClean="0"/>
-              <a:t>3/7/18</a:t>
+              <a:t>3/12/18</a:t>
             </a:fld>
             <a:endParaRPr lang="en-US"/>
           </a:p>
@@ -1162,7 +1168,7 @@
           <a:p>
             <a:fld id="{88B6F594-2319-384E-B338-97933ED39875}" type="datetimeFigureOut">
               <a:rPr lang="en-US" smtClean="0"/>
-              <a:t>3/7/18</a:t>
+              <a:t>3/12/18</a:t>
             </a:fld>
             <a:endParaRPr lang="en-US"/>
           </a:p>
@@ -1427,7 +1433,7 @@
           <a:p>
             <a:fld id="{88B6F594-2319-384E-B338-97933ED39875}" type="datetimeFigureOut">
               <a:rPr lang="en-US" smtClean="0"/>
-              <a:t>3/7/18</a:t>
+              <a:t>3/12/18</a:t>
             </a:fld>
             <a:endParaRPr lang="en-US"/>
           </a:p>
@@ -1839,7 +1845,7 @@
           <a:p>
             <a:fld id="{88B6F594-2319-384E-B338-97933ED39875}" type="datetimeFigureOut">
               <a:rPr lang="en-US" smtClean="0"/>
-              <a:t>3/7/18</a:t>
+              <a:t>3/12/18</a:t>
             </a:fld>
             <a:endParaRPr lang="en-US"/>
           </a:p>
@@ -1980,7 +1986,7 @@
           <a:p>
             <a:fld id="{88B6F594-2319-384E-B338-97933ED39875}" type="datetimeFigureOut">
               <a:rPr lang="en-US" smtClean="0"/>
-              <a:t>3/7/18</a:t>
+              <a:t>3/12/18</a:t>
             </a:fld>
             <a:endParaRPr lang="en-US"/>
           </a:p>
@@ -2093,7 +2099,7 @@
           <a:p>
             <a:fld id="{88B6F594-2319-384E-B338-97933ED39875}" type="datetimeFigureOut">
               <a:rPr lang="en-US" smtClean="0"/>
-              <a:t>3/7/18</a:t>
+              <a:t>3/12/18</a:t>
             </a:fld>
             <a:endParaRPr lang="en-US"/>
           </a:p>
@@ -2404,7 +2410,7 @@
           <a:p>
             <a:fld id="{88B6F594-2319-384E-B338-97933ED39875}" type="datetimeFigureOut">
               <a:rPr lang="en-US" smtClean="0"/>
-              <a:t>3/7/18</a:t>
+              <a:t>3/12/18</a:t>
             </a:fld>
             <a:endParaRPr lang="en-US"/>
           </a:p>
@@ -2692,7 +2698,7 @@
           <a:p>
             <a:fld id="{88B6F594-2319-384E-B338-97933ED39875}" type="datetimeFigureOut">
               <a:rPr lang="en-US" smtClean="0"/>
-              <a:t>3/7/18</a:t>
+              <a:t>3/12/18</a:t>
             </a:fld>
             <a:endParaRPr lang="en-US"/>
           </a:p>
@@ -2933,7 +2939,7 @@
           <a:p>
             <a:fld id="{88B6F594-2319-384E-B338-97933ED39875}" type="datetimeFigureOut">
               <a:rPr lang="en-US" smtClean="0"/>
-              <a:t>3/7/18</a:t>
+              <a:t>3/12/18</a:t>
             </a:fld>
             <a:endParaRPr lang="en-US"/>
           </a:p>
@@ -6091,7 +6097,10 @@
           <a:bodyPr/>
           <a:lstStyle/>
           <a:p>
-            <a:endParaRPr lang="en-US"/>
+            <a:r>
+              <a:rPr lang="en-US" dirty="0"/>
+              <a:t>Network in a container</a:t>
+            </a:r>
           </a:p>
         </p:txBody>
       </p:sp>
@@ -6117,8 +6126,40 @@
           <a:lstStyle/>
           <a:p>
             <a:r>
-              <a:rPr lang="en-US"/>
-              <a:t>http://qconsf2017intro.container.training/#219</a:t>
+              <a:rPr lang="en-US" dirty="0"/>
+              <a:t>The most common network technique we are going to see is port mapping (NAT).</a:t>
+            </a:r>
+          </a:p>
+          <a:p>
+            <a:r>
+              <a:rPr lang="en-US" dirty="0"/>
+              <a:t>The flag </a:t>
+            </a:r>
+            <a:r>
+              <a:rPr lang="en-US" b="1" dirty="0"/>
+              <a:t>-P</a:t>
+            </a:r>
+            <a:r>
+              <a:rPr lang="en-US" dirty="0"/>
+              <a:t> will tell the container that publish all ports defined on the image. This will be assigned to random ports.</a:t>
+            </a:r>
+          </a:p>
+          <a:p>
+            <a:r>
+              <a:rPr lang="en-US" dirty="0"/>
+              <a:t>The option </a:t>
+            </a:r>
+            <a:r>
+              <a:rPr lang="en-US" b="1" dirty="0"/>
+              <a:t>-p </a:t>
+            </a:r>
+            <a:r>
+              <a:rPr lang="en-US" b="1" dirty="0" err="1"/>
+              <a:t>host_port:docker_port</a:t>
+            </a:r>
+            <a:r>
+              <a:rPr lang="en-US" dirty="0"/>
+              <a:t>, can be used to statically define a port mapping. Be aware of port conflicts.</a:t>
             </a:r>
           </a:p>
         </p:txBody>
@@ -6127,6 +6168,654 @@
     <p:extLst>
       <p:ext uri="{BB962C8B-B14F-4D97-AF65-F5344CB8AC3E}">
         <p14:creationId xmlns:p14="http://schemas.microsoft.com/office/powerpoint/2010/main" val="2695847066"/>
+      </p:ext>
+    </p:extLst>
+  </p:cSld>
+  <p:clrMapOvr>
+    <a:masterClrMapping/>
+  </p:clrMapOvr>
+</p:sld>
+</file>
+
+<file path=ppt/slides/slide26.xml><?xml version="1.0" encoding="utf-8"?>
+<p:sld xmlns:a="http://schemas.openxmlformats.org/drawingml/2006/main" xmlns:r="http://schemas.openxmlformats.org/officeDocument/2006/relationships" xmlns:p="http://schemas.openxmlformats.org/presentationml/2006/main">
+  <p:cSld>
+    <p:spTree>
+      <p:nvGrpSpPr>
+        <p:cNvPr id="1" name=""/>
+        <p:cNvGrpSpPr/>
+        <p:nvPr/>
+      </p:nvGrpSpPr>
+      <p:grpSpPr>
+        <a:xfrm>
+          <a:off x="0" y="0"/>
+          <a:ext cx="0" cy="0"/>
+          <a:chOff x="0" y="0"/>
+          <a:chExt cx="0" cy="0"/>
+        </a:xfrm>
+      </p:grpSpPr>
+      <p:sp>
+        <p:nvSpPr>
+          <p:cNvPr id="2" name="Title 1">
+            <a:extLst>
+              <a:ext uri="{FF2B5EF4-FFF2-40B4-BE49-F238E27FC236}">
+                <a16:creationId xmlns:a16="http://schemas.microsoft.com/office/drawing/2014/main" id="{BEE8A639-56D8-7342-A14A-6629F3E882C4}"/>
+              </a:ext>
+            </a:extLst>
+          </p:cNvPr>
+          <p:cNvSpPr>
+            <a:spLocks noGrp="1"/>
+          </p:cNvSpPr>
+          <p:nvPr>
+            <p:ph type="title"/>
+          </p:nvPr>
+        </p:nvSpPr>
+        <p:spPr/>
+        <p:txBody>
+          <a:bodyPr/>
+          <a:lstStyle/>
+          <a:p>
+            <a:r>
+              <a:rPr lang="en-US" dirty="0"/>
+              <a:t>Network drivers</a:t>
+            </a:r>
+          </a:p>
+        </p:txBody>
+      </p:sp>
+      <p:sp>
+        <p:nvSpPr>
+          <p:cNvPr id="3" name="Content Placeholder 2">
+            <a:extLst>
+              <a:ext uri="{FF2B5EF4-FFF2-40B4-BE49-F238E27FC236}">
+                <a16:creationId xmlns:a16="http://schemas.microsoft.com/office/drawing/2014/main" id="{F27395A5-D6E4-094C-9A5C-6607841253CC}"/>
+              </a:ext>
+            </a:extLst>
+          </p:cNvPr>
+          <p:cNvSpPr>
+            <a:spLocks noGrp="1"/>
+          </p:cNvSpPr>
+          <p:nvPr>
+            <p:ph idx="1"/>
+          </p:nvPr>
+        </p:nvSpPr>
+        <p:spPr/>
+        <p:txBody>
+          <a:bodyPr/>
+          <a:lstStyle/>
+          <a:p>
+            <a:r>
+              <a:rPr lang="en-US" dirty="0"/>
+              <a:t>bridge (default): each container will get an eth0 and a loopback. The default network should be 172.17.0.0/16 but it can be changed with </a:t>
+            </a:r>
+            <a:r>
+              <a:rPr lang="en-US" b="1" dirty="0"/>
+              <a:t>–</a:t>
+            </a:r>
+            <a:r>
+              <a:rPr lang="en-US" b="1" dirty="0" err="1"/>
+              <a:t>bip</a:t>
+            </a:r>
+            <a:r>
+              <a:rPr lang="en-US" b="1" dirty="0"/>
+              <a:t> </a:t>
+            </a:r>
+            <a:r>
+              <a:rPr lang="en-US" dirty="0"/>
+              <a:t>option.</a:t>
+            </a:r>
+            <a:endParaRPr lang="en-US" b="1" dirty="0"/>
+          </a:p>
+          <a:p>
+            <a:r>
+              <a:rPr lang="en-US" dirty="0"/>
+              <a:t>none: only a loopback, no traffic in or out.</a:t>
+            </a:r>
+          </a:p>
+          <a:p>
+            <a:r>
+              <a:rPr lang="en-US" dirty="0"/>
+              <a:t>host: using the option </a:t>
+            </a:r>
+            <a:r>
+              <a:rPr lang="en-US" b="1" dirty="0"/>
+              <a:t>--net host, </a:t>
+            </a:r>
+            <a:r>
+              <a:rPr lang="en-US" dirty="0"/>
+              <a:t>the container will share the host network stack.</a:t>
+            </a:r>
+            <a:endParaRPr lang="en-US" b="1" dirty="0"/>
+          </a:p>
+          <a:p>
+            <a:r>
+              <a:rPr lang="en-US" dirty="0"/>
+              <a:t>container: using the option </a:t>
+            </a:r>
+            <a:r>
+              <a:rPr lang="en-US" b="1" dirty="0"/>
+              <a:t>--net </a:t>
+            </a:r>
+            <a:r>
+              <a:rPr lang="en-US" b="1" dirty="0" err="1"/>
+              <a:t>container:id</a:t>
+            </a:r>
+            <a:r>
+              <a:rPr lang="en-US" dirty="0"/>
+              <a:t>, the container will share with another container the network stack.</a:t>
+            </a:r>
+            <a:endParaRPr lang="en-US" b="1" dirty="0"/>
+          </a:p>
+          <a:p>
+            <a:endParaRPr lang="en-US" dirty="0"/>
+          </a:p>
+        </p:txBody>
+      </p:sp>
+    </p:spTree>
+    <p:extLst>
+      <p:ext uri="{BB962C8B-B14F-4D97-AF65-F5344CB8AC3E}">
+        <p14:creationId xmlns:p14="http://schemas.microsoft.com/office/powerpoint/2010/main" val="937568522"/>
+      </p:ext>
+    </p:extLst>
+  </p:cSld>
+  <p:clrMapOvr>
+    <a:masterClrMapping/>
+  </p:clrMapOvr>
+</p:sld>
+</file>
+
+<file path=ppt/slides/slide27.xml><?xml version="1.0" encoding="utf-8"?>
+<p:sld xmlns:a="http://schemas.openxmlformats.org/drawingml/2006/main" xmlns:r="http://schemas.openxmlformats.org/officeDocument/2006/relationships" xmlns:p="http://schemas.openxmlformats.org/presentationml/2006/main">
+  <p:cSld>
+    <p:spTree>
+      <p:nvGrpSpPr>
+        <p:cNvPr id="1" name=""/>
+        <p:cNvGrpSpPr/>
+        <p:nvPr/>
+      </p:nvGrpSpPr>
+      <p:grpSpPr>
+        <a:xfrm>
+          <a:off x="0" y="0"/>
+          <a:ext cx="0" cy="0"/>
+          <a:chOff x="0" y="0"/>
+          <a:chExt cx="0" cy="0"/>
+        </a:xfrm>
+      </p:grpSpPr>
+      <p:sp>
+        <p:nvSpPr>
+          <p:cNvPr id="2" name="Title 1">
+            <a:extLst>
+              <a:ext uri="{FF2B5EF4-FFF2-40B4-BE49-F238E27FC236}">
+                <a16:creationId xmlns:a16="http://schemas.microsoft.com/office/drawing/2014/main" id="{761B4899-A8FC-A84C-A038-7CD141068438}"/>
+              </a:ext>
+            </a:extLst>
+          </p:cNvPr>
+          <p:cNvSpPr>
+            <a:spLocks noGrp="1"/>
+          </p:cNvSpPr>
+          <p:nvPr>
+            <p:ph type="title"/>
+          </p:nvPr>
+        </p:nvSpPr>
+        <p:spPr/>
+        <p:txBody>
+          <a:bodyPr/>
+          <a:lstStyle/>
+          <a:p>
+            <a:r>
+              <a:rPr lang="en-US" dirty="0"/>
+              <a:t>What network means to a container</a:t>
+            </a:r>
+          </a:p>
+        </p:txBody>
+      </p:sp>
+      <p:sp>
+        <p:nvSpPr>
+          <p:cNvPr id="3" name="Content Placeholder 2">
+            <a:extLst>
+              <a:ext uri="{FF2B5EF4-FFF2-40B4-BE49-F238E27FC236}">
+                <a16:creationId xmlns:a16="http://schemas.microsoft.com/office/drawing/2014/main" id="{17962348-F8BD-4240-8226-17218869690E}"/>
+              </a:ext>
+            </a:extLst>
+          </p:cNvPr>
+          <p:cNvSpPr>
+            <a:spLocks noGrp="1"/>
+          </p:cNvSpPr>
+          <p:nvPr>
+            <p:ph idx="1"/>
+          </p:nvPr>
+        </p:nvSpPr>
+        <p:spPr/>
+        <p:txBody>
+          <a:bodyPr>
+            <a:normAutofit fontScale="92500"/>
+          </a:bodyPr>
+          <a:lstStyle/>
+          <a:p>
+            <a:r>
+              <a:rPr lang="en-US" dirty="0"/>
+              <a:t>Is network just a “virtual switch”??</a:t>
+            </a:r>
+          </a:p>
+          <a:p>
+            <a:r>
+              <a:rPr lang="en-US" dirty="0"/>
+              <a:t>Create a new network:</a:t>
+            </a:r>
+          </a:p>
+          <a:p>
+            <a:pPr lvl="1"/>
+            <a:r>
+              <a:rPr lang="en-US" b="1" dirty="0" err="1"/>
+              <a:t>docker</a:t>
+            </a:r>
+            <a:r>
+              <a:rPr lang="en-US" b="1" dirty="0"/>
+              <a:t> network create </a:t>
+            </a:r>
+            <a:r>
+              <a:rPr lang="en-US" b="1" dirty="0" err="1"/>
+              <a:t>my_test</a:t>
+            </a:r>
+            <a:endParaRPr lang="en-US" b="1" dirty="0"/>
+          </a:p>
+          <a:p>
+            <a:r>
+              <a:rPr lang="en-US" dirty="0"/>
+              <a:t>Create a container in the new network:</a:t>
+            </a:r>
+          </a:p>
+          <a:p>
+            <a:pPr lvl="1"/>
+            <a:r>
+              <a:rPr lang="en-US" b="1" dirty="0" err="1"/>
+              <a:t>docker</a:t>
+            </a:r>
+            <a:r>
+              <a:rPr lang="en-US" b="1" dirty="0"/>
+              <a:t> run -d -P --name web3 --net </a:t>
+            </a:r>
+            <a:r>
+              <a:rPr lang="en-US" b="1" dirty="0" err="1"/>
+              <a:t>my_test</a:t>
+            </a:r>
+            <a:r>
+              <a:rPr lang="en-US" b="1" dirty="0"/>
+              <a:t> </a:t>
+            </a:r>
+            <a:r>
+              <a:rPr lang="en-US" b="1" dirty="0" err="1"/>
+              <a:t>nginx</a:t>
+            </a:r>
+            <a:endParaRPr lang="en-US" b="1" dirty="0"/>
+          </a:p>
+          <a:p>
+            <a:r>
+              <a:rPr lang="en-US" dirty="0"/>
+              <a:t>Create another container:</a:t>
+            </a:r>
+          </a:p>
+          <a:p>
+            <a:pPr lvl="1"/>
+            <a:r>
+              <a:rPr lang="en-US" b="1" dirty="0" err="1"/>
+              <a:t>docker</a:t>
+            </a:r>
+            <a:r>
+              <a:rPr lang="en-US" b="1" dirty="0"/>
+              <a:t> run -</a:t>
+            </a:r>
+            <a:r>
+              <a:rPr lang="en-US" b="1" dirty="0" err="1"/>
+              <a:t>ti</a:t>
+            </a:r>
+            <a:r>
+              <a:rPr lang="en-US" b="1" dirty="0"/>
+              <a:t> --</a:t>
+            </a:r>
+            <a:r>
+              <a:rPr lang="en-US" b="1" dirty="0" err="1"/>
+              <a:t>rm</a:t>
+            </a:r>
+            <a:r>
+              <a:rPr lang="en-US" b="1" dirty="0"/>
+              <a:t> --name </a:t>
+            </a:r>
+            <a:r>
+              <a:rPr lang="en-US" b="1" dirty="0" err="1"/>
+              <a:t>test_node</a:t>
+            </a:r>
+            <a:r>
+              <a:rPr lang="en-US" b="1" dirty="0"/>
+              <a:t> --net </a:t>
+            </a:r>
+            <a:r>
+              <a:rPr lang="en-US" b="1" dirty="0" err="1"/>
+              <a:t>my_test</a:t>
+            </a:r>
+            <a:r>
+              <a:rPr lang="en-US" b="1" dirty="0"/>
+              <a:t> alpine ping web3</a:t>
+            </a:r>
+          </a:p>
+          <a:p>
+            <a:r>
+              <a:rPr lang="en-US" dirty="0"/>
+              <a:t>Did we configure name resolution?</a:t>
+            </a:r>
+          </a:p>
+          <a:p>
+            <a:pPr lvl="1"/>
+            <a:r>
+              <a:rPr lang="en-US" b="1" dirty="0" err="1"/>
+              <a:t>docker</a:t>
+            </a:r>
+            <a:r>
+              <a:rPr lang="en-US" b="1" dirty="0"/>
+              <a:t> run -</a:t>
+            </a:r>
+            <a:r>
+              <a:rPr lang="en-US" b="1" dirty="0" err="1"/>
+              <a:t>ti</a:t>
+            </a:r>
+            <a:r>
+              <a:rPr lang="en-US" b="1" dirty="0"/>
+              <a:t> --</a:t>
+            </a:r>
+            <a:r>
+              <a:rPr lang="en-US" b="1" dirty="0" err="1"/>
+              <a:t>rm</a:t>
+            </a:r>
+            <a:r>
+              <a:rPr lang="en-US" b="1" dirty="0"/>
+              <a:t> --name </a:t>
+            </a:r>
+            <a:r>
+              <a:rPr lang="en-US" b="1" dirty="0" err="1"/>
+              <a:t>test_node</a:t>
+            </a:r>
+            <a:r>
+              <a:rPr lang="en-US" b="1" dirty="0"/>
+              <a:t> --net </a:t>
+            </a:r>
+            <a:r>
+              <a:rPr lang="en-US" b="1" dirty="0" err="1"/>
+              <a:t>my_test</a:t>
+            </a:r>
+            <a:r>
+              <a:rPr lang="en-US" b="1" dirty="0"/>
+              <a:t> alpine cat /</a:t>
+            </a:r>
+            <a:r>
+              <a:rPr lang="en-US" b="1" dirty="0" err="1"/>
+              <a:t>etc</a:t>
+            </a:r>
+            <a:r>
+              <a:rPr lang="en-US" b="1" dirty="0"/>
+              <a:t>/</a:t>
+            </a:r>
+            <a:r>
+              <a:rPr lang="en-US" b="1" dirty="0" err="1"/>
+              <a:t>resolv.conf</a:t>
+            </a:r>
+            <a:endParaRPr lang="en-US" b="1" dirty="0"/>
+          </a:p>
+          <a:p>
+            <a:r>
+              <a:rPr lang="en-US" dirty="0"/>
+              <a:t>Who is 127.0.0.11?</a:t>
+            </a:r>
+          </a:p>
+          <a:p>
+            <a:endParaRPr lang="en-US" dirty="0"/>
+          </a:p>
+          <a:p>
+            <a:endParaRPr lang="en-US" dirty="0"/>
+          </a:p>
+        </p:txBody>
+      </p:sp>
+    </p:spTree>
+    <p:extLst>
+      <p:ext uri="{BB962C8B-B14F-4D97-AF65-F5344CB8AC3E}">
+        <p14:creationId xmlns:p14="http://schemas.microsoft.com/office/powerpoint/2010/main" val="4114912195"/>
+      </p:ext>
+    </p:extLst>
+  </p:cSld>
+  <p:clrMapOvr>
+    <a:masterClrMapping/>
+  </p:clrMapOvr>
+</p:sld>
+</file>
+
+<file path=ppt/slides/slide28.xml><?xml version="1.0" encoding="utf-8"?>
+<p:sld xmlns:a="http://schemas.openxmlformats.org/drawingml/2006/main" xmlns:r="http://schemas.openxmlformats.org/officeDocument/2006/relationships" xmlns:p="http://schemas.openxmlformats.org/presentationml/2006/main">
+  <p:cSld>
+    <p:spTree>
+      <p:nvGrpSpPr>
+        <p:cNvPr id="1" name=""/>
+        <p:cNvGrpSpPr/>
+        <p:nvPr/>
+      </p:nvGrpSpPr>
+      <p:grpSpPr>
+        <a:xfrm>
+          <a:off x="0" y="0"/>
+          <a:ext cx="0" cy="0"/>
+          <a:chOff x="0" y="0"/>
+          <a:chExt cx="0" cy="0"/>
+        </a:xfrm>
+      </p:grpSpPr>
+      <p:sp>
+        <p:nvSpPr>
+          <p:cNvPr id="2" name="Title 1">
+            <a:extLst>
+              <a:ext uri="{FF2B5EF4-FFF2-40B4-BE49-F238E27FC236}">
+                <a16:creationId xmlns:a16="http://schemas.microsoft.com/office/drawing/2014/main" id="{CB55A31C-FA78-FB42-8804-3BF14FBC62B7}"/>
+              </a:ext>
+            </a:extLst>
+          </p:cNvPr>
+          <p:cNvSpPr>
+            <a:spLocks noGrp="1"/>
+          </p:cNvSpPr>
+          <p:nvPr>
+            <p:ph type="title"/>
+          </p:nvPr>
+        </p:nvSpPr>
+        <p:spPr/>
+        <p:txBody>
+          <a:bodyPr/>
+          <a:lstStyle/>
+          <a:p>
+            <a:r>
+              <a:rPr lang="en-US" dirty="0"/>
+              <a:t>Storage for containers</a:t>
+            </a:r>
+          </a:p>
+        </p:txBody>
+      </p:sp>
+      <p:sp>
+        <p:nvSpPr>
+          <p:cNvPr id="3" name="Content Placeholder 2">
+            <a:extLst>
+              <a:ext uri="{FF2B5EF4-FFF2-40B4-BE49-F238E27FC236}">
+                <a16:creationId xmlns:a16="http://schemas.microsoft.com/office/drawing/2014/main" id="{6F16A4B6-4E05-E748-8D95-7F77DCBA7CA9}"/>
+              </a:ext>
+            </a:extLst>
+          </p:cNvPr>
+          <p:cNvSpPr>
+            <a:spLocks noGrp="1"/>
+          </p:cNvSpPr>
+          <p:nvPr>
+            <p:ph idx="1"/>
+          </p:nvPr>
+        </p:nvSpPr>
+        <p:spPr/>
+        <p:txBody>
+          <a:bodyPr/>
+          <a:lstStyle/>
+          <a:p>
+            <a:r>
+              <a:rPr lang="en-US" dirty="0"/>
+              <a:t>There are tree storage types:</a:t>
+            </a:r>
+          </a:p>
+          <a:p>
+            <a:pPr lvl="1"/>
+            <a:r>
+              <a:rPr lang="en-US" dirty="0"/>
+              <a:t>Volumes.</a:t>
+            </a:r>
+          </a:p>
+          <a:p>
+            <a:pPr lvl="1"/>
+            <a:r>
+              <a:rPr lang="en-US" dirty="0"/>
+              <a:t>Binds.</a:t>
+            </a:r>
+          </a:p>
+          <a:p>
+            <a:pPr lvl="1"/>
+            <a:r>
+              <a:rPr lang="en-US" dirty="0" err="1"/>
+              <a:t>Tmpfs</a:t>
+            </a:r>
+            <a:r>
+              <a:rPr lang="en-US" dirty="0"/>
+              <a:t>.</a:t>
+            </a:r>
+          </a:p>
+          <a:p>
+            <a:pPr marL="457200" lvl="1" indent="0">
+              <a:buNone/>
+            </a:pPr>
+            <a:endParaRPr lang="en-US" dirty="0"/>
+          </a:p>
+        </p:txBody>
+      </p:sp>
+      <p:pic>
+        <p:nvPicPr>
+          <p:cNvPr id="5" name="Picture 4">
+            <a:extLst>
+              <a:ext uri="{FF2B5EF4-FFF2-40B4-BE49-F238E27FC236}">
+                <a16:creationId xmlns:a16="http://schemas.microsoft.com/office/drawing/2014/main" id="{A0ECFC75-2994-A149-8696-0306DCDB01FD}"/>
+              </a:ext>
+            </a:extLst>
+          </p:cNvPr>
+          <p:cNvPicPr>
+            <a:picLocks noChangeAspect="1"/>
+          </p:cNvPicPr>
+          <p:nvPr/>
+        </p:nvPicPr>
+        <p:blipFill>
+          <a:blip r:embed="rId2"/>
+          <a:stretch>
+            <a:fillRect/>
+          </a:stretch>
+        </p:blipFill>
+        <p:spPr>
+          <a:xfrm>
+            <a:off x="3267184" y="2393512"/>
+            <a:ext cx="7150100" cy="3416300"/>
+          </a:xfrm>
+          <a:prstGeom prst="rect">
+            <a:avLst/>
+          </a:prstGeom>
+        </p:spPr>
+      </p:pic>
+    </p:spTree>
+    <p:extLst>
+      <p:ext uri="{BB962C8B-B14F-4D97-AF65-F5344CB8AC3E}">
+        <p14:creationId xmlns:p14="http://schemas.microsoft.com/office/powerpoint/2010/main" val="843579182"/>
+      </p:ext>
+    </p:extLst>
+  </p:cSld>
+  <p:clrMapOvr>
+    <a:masterClrMapping/>
+  </p:clrMapOvr>
+</p:sld>
+</file>
+
+<file path=ppt/slides/slide29.xml><?xml version="1.0" encoding="utf-8"?>
+<p:sld xmlns:a="http://schemas.openxmlformats.org/drawingml/2006/main" xmlns:r="http://schemas.openxmlformats.org/officeDocument/2006/relationships" xmlns:p="http://schemas.openxmlformats.org/presentationml/2006/main">
+  <p:cSld>
+    <p:spTree>
+      <p:nvGrpSpPr>
+        <p:cNvPr id="1" name=""/>
+        <p:cNvGrpSpPr/>
+        <p:nvPr/>
+      </p:nvGrpSpPr>
+      <p:grpSpPr>
+        <a:xfrm>
+          <a:off x="0" y="0"/>
+          <a:ext cx="0" cy="0"/>
+          <a:chOff x="0" y="0"/>
+          <a:chExt cx="0" cy="0"/>
+        </a:xfrm>
+      </p:grpSpPr>
+      <p:sp>
+        <p:nvSpPr>
+          <p:cNvPr id="2" name="Title 1">
+            <a:extLst>
+              <a:ext uri="{FF2B5EF4-FFF2-40B4-BE49-F238E27FC236}">
+                <a16:creationId xmlns:a16="http://schemas.microsoft.com/office/drawing/2014/main" id="{C4BD9F51-F3E9-5D4B-962C-7D0ADB2F13F3}"/>
+              </a:ext>
+            </a:extLst>
+          </p:cNvPr>
+          <p:cNvSpPr>
+            <a:spLocks noGrp="1"/>
+          </p:cNvSpPr>
+          <p:nvPr>
+            <p:ph type="title"/>
+          </p:nvPr>
+        </p:nvSpPr>
+        <p:spPr/>
+        <p:txBody>
+          <a:bodyPr/>
+          <a:lstStyle/>
+          <a:p>
+            <a:r>
+              <a:rPr lang="en-US" dirty="0"/>
+              <a:t>Containers and volumes</a:t>
+            </a:r>
+          </a:p>
+        </p:txBody>
+      </p:sp>
+      <p:sp>
+        <p:nvSpPr>
+          <p:cNvPr id="3" name="Content Placeholder 2">
+            <a:extLst>
+              <a:ext uri="{FF2B5EF4-FFF2-40B4-BE49-F238E27FC236}">
+                <a16:creationId xmlns:a16="http://schemas.microsoft.com/office/drawing/2014/main" id="{7D5A3403-EF04-1F41-9E21-A16FC2E183CD}"/>
+              </a:ext>
+            </a:extLst>
+          </p:cNvPr>
+          <p:cNvSpPr>
+            <a:spLocks noGrp="1"/>
+          </p:cNvSpPr>
+          <p:nvPr>
+            <p:ph idx="1"/>
+          </p:nvPr>
+        </p:nvSpPr>
+        <p:spPr/>
+        <p:txBody>
+          <a:bodyPr/>
+          <a:lstStyle/>
+          <a:p>
+            <a:r>
+              <a:rPr lang="en-US" dirty="0"/>
+              <a:t>Volumes are specially designated directories within one or more containers that bypass the layered File System to provide persistent or shared data for Docker.</a:t>
+            </a:r>
+          </a:p>
+          <a:p>
+            <a:r>
+              <a:rPr lang="en-US" dirty="0"/>
+              <a:t>The volume exist Docker’s storage directory on the host machine.</a:t>
+            </a:r>
+          </a:p>
+        </p:txBody>
+      </p:sp>
+    </p:spTree>
+    <p:extLst>
+      <p:ext uri="{BB962C8B-B14F-4D97-AF65-F5344CB8AC3E}">
+        <p14:creationId xmlns:p14="http://schemas.microsoft.com/office/powerpoint/2010/main" val="2912083142"/>
       </p:ext>
     </p:extLst>
   </p:cSld>
@@ -6253,6 +6942,353 @@
     <p:extLst>
       <p:ext uri="{BB962C8B-B14F-4D97-AF65-F5344CB8AC3E}">
         <p14:creationId xmlns:p14="http://schemas.microsoft.com/office/powerpoint/2010/main" val="3269720027"/>
+      </p:ext>
+    </p:extLst>
+  </p:cSld>
+  <p:clrMapOvr>
+    <a:masterClrMapping/>
+  </p:clrMapOvr>
+</p:sld>
+</file>
+
+<file path=ppt/slides/slide30.xml><?xml version="1.0" encoding="utf-8"?>
+<p:sld xmlns:a="http://schemas.openxmlformats.org/drawingml/2006/main" xmlns:r="http://schemas.openxmlformats.org/officeDocument/2006/relationships" xmlns:p="http://schemas.openxmlformats.org/presentationml/2006/main">
+  <p:cSld>
+    <p:spTree>
+      <p:nvGrpSpPr>
+        <p:cNvPr id="1" name=""/>
+        <p:cNvGrpSpPr/>
+        <p:nvPr/>
+      </p:nvGrpSpPr>
+      <p:grpSpPr>
+        <a:xfrm>
+          <a:off x="0" y="0"/>
+          <a:ext cx="0" cy="0"/>
+          <a:chOff x="0" y="0"/>
+          <a:chExt cx="0" cy="0"/>
+        </a:xfrm>
+      </p:grpSpPr>
+      <p:sp>
+        <p:nvSpPr>
+          <p:cNvPr id="2" name="Title 1">
+            <a:extLst>
+              <a:ext uri="{FF2B5EF4-FFF2-40B4-BE49-F238E27FC236}">
+                <a16:creationId xmlns:a16="http://schemas.microsoft.com/office/drawing/2014/main" id="{183B73D1-7599-654E-9FAD-0BDFEE0E255E}"/>
+              </a:ext>
+            </a:extLst>
+          </p:cNvPr>
+          <p:cNvSpPr>
+            <a:spLocks noGrp="1"/>
+          </p:cNvSpPr>
+          <p:nvPr>
+            <p:ph type="title"/>
+          </p:nvPr>
+        </p:nvSpPr>
+        <p:spPr/>
+        <p:txBody>
+          <a:bodyPr/>
+          <a:lstStyle/>
+          <a:p>
+            <a:r>
+              <a:rPr lang="en-US" dirty="0"/>
+              <a:t>Containers and volumes</a:t>
+            </a:r>
+          </a:p>
+        </p:txBody>
+      </p:sp>
+      <p:sp>
+        <p:nvSpPr>
+          <p:cNvPr id="3" name="Content Placeholder 2">
+            <a:extLst>
+              <a:ext uri="{FF2B5EF4-FFF2-40B4-BE49-F238E27FC236}">
+                <a16:creationId xmlns:a16="http://schemas.microsoft.com/office/drawing/2014/main" id="{4FD3B95C-C70C-5C42-952D-BF355B5D5B0B}"/>
+              </a:ext>
+            </a:extLst>
+          </p:cNvPr>
+          <p:cNvSpPr>
+            <a:spLocks noGrp="1"/>
+          </p:cNvSpPr>
+          <p:nvPr>
+            <p:ph idx="1"/>
+          </p:nvPr>
+        </p:nvSpPr>
+        <p:spPr/>
+        <p:txBody>
+          <a:bodyPr>
+            <a:normAutofit fontScale="92500"/>
+          </a:bodyPr>
+          <a:lstStyle/>
+          <a:p>
+            <a:r>
+              <a:rPr lang="en-US" dirty="0"/>
+              <a:t>Create a volume.   </a:t>
+            </a:r>
+          </a:p>
+          <a:p>
+            <a:pPr lvl="1"/>
+            <a:r>
+              <a:rPr lang="en-US" dirty="0"/>
+              <a:t> </a:t>
+            </a:r>
+            <a:r>
+              <a:rPr lang="en-US" b="1" dirty="0" err="1"/>
+              <a:t>docker</a:t>
+            </a:r>
+            <a:r>
+              <a:rPr lang="en-US" b="1" dirty="0"/>
+              <a:t> run -</a:t>
+            </a:r>
+            <a:r>
+              <a:rPr lang="en-US" b="1" dirty="0" err="1"/>
+              <a:t>ti</a:t>
+            </a:r>
+            <a:r>
+              <a:rPr lang="en-US" b="1" dirty="0"/>
+              <a:t> --</a:t>
+            </a:r>
+            <a:r>
+              <a:rPr lang="en-US" b="1" dirty="0" err="1"/>
+              <a:t>rm</a:t>
+            </a:r>
+            <a:r>
+              <a:rPr lang="en-US" b="1" dirty="0"/>
+              <a:t> -v </a:t>
+            </a:r>
+            <a:r>
+              <a:rPr lang="en-US" b="1" dirty="0" err="1"/>
+              <a:t>new_vol</a:t>
+            </a:r>
+            <a:r>
+              <a:rPr lang="en-US" b="1" dirty="0"/>
+              <a:t> --name </a:t>
+            </a:r>
+            <a:r>
+              <a:rPr lang="en-US" b="1" dirty="0" err="1"/>
+              <a:t>test_volume</a:t>
+            </a:r>
+            <a:r>
+              <a:rPr lang="en-US" b="1" dirty="0"/>
+              <a:t> alpine </a:t>
+            </a:r>
+            <a:r>
+              <a:rPr lang="en-US" b="1" dirty="0" err="1"/>
+              <a:t>sh</a:t>
+            </a:r>
+            <a:endParaRPr lang="en-US" b="1" dirty="0"/>
+          </a:p>
+          <a:p>
+            <a:r>
+              <a:rPr lang="en-US" dirty="0"/>
+              <a:t>Check the new volume inside the container.    </a:t>
+            </a:r>
+          </a:p>
+          <a:p>
+            <a:pPr lvl="1"/>
+            <a:r>
+              <a:rPr lang="en-US" b="1" dirty="0" err="1"/>
+              <a:t>df</a:t>
+            </a:r>
+            <a:r>
+              <a:rPr lang="en-US" b="1" dirty="0"/>
+              <a:t> –h</a:t>
+            </a:r>
+          </a:p>
+          <a:p>
+            <a:r>
+              <a:rPr lang="en-US" dirty="0"/>
+              <a:t>Create a file on that volume.   </a:t>
+            </a:r>
+          </a:p>
+          <a:p>
+            <a:pPr lvl="1"/>
+            <a:r>
+              <a:rPr lang="en-US" dirty="0"/>
+              <a:t> </a:t>
+            </a:r>
+            <a:r>
+              <a:rPr lang="en-US" b="1" dirty="0"/>
+              <a:t>echo 'this is a test' &gt;&gt; /</a:t>
+            </a:r>
+            <a:r>
+              <a:rPr lang="en-US" b="1" dirty="0" err="1"/>
+              <a:t>new_vol</a:t>
+            </a:r>
+            <a:r>
+              <a:rPr lang="en-US" b="1" dirty="0"/>
+              <a:t>/</a:t>
+            </a:r>
+            <a:r>
+              <a:rPr lang="en-US" b="1" dirty="0" err="1"/>
+              <a:t>test.txt</a:t>
+            </a:r>
+            <a:endParaRPr lang="en-US" b="1" dirty="0"/>
+          </a:p>
+          <a:p>
+            <a:r>
+              <a:rPr lang="en-US" dirty="0"/>
+              <a:t>Create another container with same volume.    </a:t>
+            </a:r>
+          </a:p>
+          <a:p>
+            <a:pPr lvl="1"/>
+            <a:r>
+              <a:rPr lang="en-US" b="1" dirty="0" err="1"/>
+              <a:t>docker</a:t>
+            </a:r>
+            <a:r>
+              <a:rPr lang="en-US" b="1" dirty="0"/>
+              <a:t> run -it --</a:t>
+            </a:r>
+            <a:r>
+              <a:rPr lang="en-US" b="1" dirty="0" err="1"/>
+              <a:t>rm</a:t>
+            </a:r>
+            <a:r>
+              <a:rPr lang="en-US" b="1" dirty="0"/>
+              <a:t> --volumes-from </a:t>
+            </a:r>
+            <a:r>
+              <a:rPr lang="en-US" b="1" dirty="0" err="1"/>
+              <a:t>test_volume</a:t>
+            </a:r>
+            <a:r>
+              <a:rPr lang="en-US" b="1" dirty="0"/>
+              <a:t> --name test_volumne_1 alpine </a:t>
+            </a:r>
+            <a:r>
+              <a:rPr lang="en-US" b="1" dirty="0" err="1"/>
+              <a:t>sh</a:t>
+            </a:r>
+            <a:endParaRPr lang="en-US" b="1" dirty="0"/>
+          </a:p>
+          <a:p>
+            <a:r>
+              <a:rPr lang="en-US" dirty="0"/>
+              <a:t>Verify the file created in the other container exist.    </a:t>
+            </a:r>
+          </a:p>
+          <a:p>
+            <a:pPr lvl="1"/>
+            <a:r>
+              <a:rPr lang="en-US" dirty="0"/>
+              <a:t> </a:t>
+            </a:r>
+            <a:r>
+              <a:rPr lang="en-US" b="1" dirty="0"/>
+              <a:t>cat /</a:t>
+            </a:r>
+            <a:r>
+              <a:rPr lang="en-US" b="1" dirty="0" err="1"/>
+              <a:t>new_vol</a:t>
+            </a:r>
+            <a:r>
+              <a:rPr lang="en-US" b="1" dirty="0"/>
+              <a:t>/</a:t>
+            </a:r>
+            <a:r>
+              <a:rPr lang="en-US" b="1" dirty="0" err="1"/>
+              <a:t>test.txt</a:t>
+            </a:r>
+            <a:endParaRPr lang="en-US" b="1" dirty="0"/>
+          </a:p>
+        </p:txBody>
+      </p:sp>
+    </p:spTree>
+    <p:extLst>
+      <p:ext uri="{BB962C8B-B14F-4D97-AF65-F5344CB8AC3E}">
+        <p14:creationId xmlns:p14="http://schemas.microsoft.com/office/powerpoint/2010/main" val="3421253644"/>
+      </p:ext>
+    </p:extLst>
+  </p:cSld>
+  <p:clrMapOvr>
+    <a:masterClrMapping/>
+  </p:clrMapOvr>
+</p:sld>
+</file>
+
+<file path=ppt/slides/slide31.xml><?xml version="1.0" encoding="utf-8"?>
+<p:sld xmlns:a="http://schemas.openxmlformats.org/drawingml/2006/main" xmlns:r="http://schemas.openxmlformats.org/officeDocument/2006/relationships" xmlns:p="http://schemas.openxmlformats.org/presentationml/2006/main">
+  <p:cSld>
+    <p:spTree>
+      <p:nvGrpSpPr>
+        <p:cNvPr id="1" name=""/>
+        <p:cNvGrpSpPr/>
+        <p:nvPr/>
+      </p:nvGrpSpPr>
+      <p:grpSpPr>
+        <a:xfrm>
+          <a:off x="0" y="0"/>
+          <a:ext cx="0" cy="0"/>
+          <a:chOff x="0" y="0"/>
+          <a:chExt cx="0" cy="0"/>
+        </a:xfrm>
+      </p:grpSpPr>
+      <p:sp>
+        <p:nvSpPr>
+          <p:cNvPr id="2" name="Title 1">
+            <a:extLst>
+              <a:ext uri="{FF2B5EF4-FFF2-40B4-BE49-F238E27FC236}">
+                <a16:creationId xmlns:a16="http://schemas.microsoft.com/office/drawing/2014/main" id="{3BE43A3D-9665-FC4E-A990-33A73BC27EAC}"/>
+              </a:ext>
+            </a:extLst>
+          </p:cNvPr>
+          <p:cNvSpPr>
+            <a:spLocks noGrp="1"/>
+          </p:cNvSpPr>
+          <p:nvPr>
+            <p:ph type="title"/>
+          </p:nvPr>
+        </p:nvSpPr>
+        <p:spPr/>
+        <p:txBody>
+          <a:bodyPr/>
+          <a:lstStyle/>
+          <a:p>
+            <a:r>
+              <a:rPr lang="en-US" dirty="0"/>
+              <a:t>Containers and bindings</a:t>
+            </a:r>
+          </a:p>
+        </p:txBody>
+      </p:sp>
+      <p:sp>
+        <p:nvSpPr>
+          <p:cNvPr id="3" name="Content Placeholder 2">
+            <a:extLst>
+              <a:ext uri="{FF2B5EF4-FFF2-40B4-BE49-F238E27FC236}">
+                <a16:creationId xmlns:a16="http://schemas.microsoft.com/office/drawing/2014/main" id="{EFC6314E-085C-484A-9F37-09440C14BA14}"/>
+              </a:ext>
+            </a:extLst>
+          </p:cNvPr>
+          <p:cNvSpPr>
+            <a:spLocks noGrp="1"/>
+          </p:cNvSpPr>
+          <p:nvPr>
+            <p:ph idx="1"/>
+          </p:nvPr>
+        </p:nvSpPr>
+        <p:spPr/>
+        <p:txBody>
+          <a:bodyPr/>
+          <a:lstStyle/>
+          <a:p>
+            <a:r>
+              <a:rPr lang="en-US" dirty="0"/>
+              <a:t>Bind mounts have limited functionality compared to volumes.</a:t>
+            </a:r>
+          </a:p>
+          <a:p>
+            <a:r>
+              <a:rPr lang="en-US" dirty="0"/>
+              <a:t>When you use a bind mount, a file or directory on the host machine is mounted into a container. </a:t>
+            </a:r>
+          </a:p>
+        </p:txBody>
+      </p:sp>
+    </p:spTree>
+    <p:extLst>
+      <p:ext uri="{BB962C8B-B14F-4D97-AF65-F5344CB8AC3E}">
+        <p14:creationId xmlns:p14="http://schemas.microsoft.com/office/powerpoint/2010/main" val="4178305918"/>
       </p:ext>
     </p:extLst>
   </p:cSld>

</xml_diff>

<commit_message>
adding the url of the tutorial
</commit_message>
<xml_diff>
--- a/Docker presentation.pptx
+++ b/Docker presentation.pptx
@@ -3402,7 +3402,10 @@
           <a:bodyPr/>
           <a:lstStyle/>
           <a:p>
-            <a:endParaRPr lang="en-US"/>
+            <a:r>
+              <a:rPr lang="en-US"/>
+              <a:t>http://qconsf2017intro.container.training/#332</a:t>
+            </a:r>
           </a:p>
         </p:txBody>
       </p:sp>

</xml_diff>

<commit_message>
update for the storage type bindings
</commit_message>
<xml_diff>
--- a/Docker presentation.pptx
+++ b/Docker presentation.pptx
@@ -36,6 +36,10 @@
     <p:sldId id="284" r:id="rId30"/>
     <p:sldId id="286" r:id="rId31"/>
     <p:sldId id="285" r:id="rId32"/>
+    <p:sldId id="287" r:id="rId33"/>
+    <p:sldId id="289" r:id="rId34"/>
+    <p:sldId id="290" r:id="rId35"/>
+    <p:sldId id="291" r:id="rId36"/>
   </p:sldIdLst>
   <p:sldSz cx="12192000" cy="6858000"/>
   <p:notesSz cx="6858000" cy="9144000"/>
@@ -289,7 +293,7 @@
           <a:p>
             <a:fld id="{88B6F594-2319-384E-B338-97933ED39875}" type="datetimeFigureOut">
               <a:rPr lang="en-US" smtClean="0"/>
-              <a:t>3/12/18</a:t>
+              <a:t>3/13/18</a:t>
             </a:fld>
             <a:endParaRPr lang="en-US"/>
           </a:p>
@@ -487,7 +491,7 @@
           <a:p>
             <a:fld id="{88B6F594-2319-384E-B338-97933ED39875}" type="datetimeFigureOut">
               <a:rPr lang="en-US" smtClean="0"/>
-              <a:t>3/12/18</a:t>
+              <a:t>3/13/18</a:t>
             </a:fld>
             <a:endParaRPr lang="en-US"/>
           </a:p>
@@ -695,7 +699,7 @@
           <a:p>
             <a:fld id="{88B6F594-2319-384E-B338-97933ED39875}" type="datetimeFigureOut">
               <a:rPr lang="en-US" smtClean="0"/>
-              <a:t>3/12/18</a:t>
+              <a:t>3/13/18</a:t>
             </a:fld>
             <a:endParaRPr lang="en-US"/>
           </a:p>
@@ -893,7 +897,7 @@
           <a:p>
             <a:fld id="{88B6F594-2319-384E-B338-97933ED39875}" type="datetimeFigureOut">
               <a:rPr lang="en-US" smtClean="0"/>
-              <a:t>3/12/18</a:t>
+              <a:t>3/13/18</a:t>
             </a:fld>
             <a:endParaRPr lang="en-US"/>
           </a:p>
@@ -1168,7 +1172,7 @@
           <a:p>
             <a:fld id="{88B6F594-2319-384E-B338-97933ED39875}" type="datetimeFigureOut">
               <a:rPr lang="en-US" smtClean="0"/>
-              <a:t>3/12/18</a:t>
+              <a:t>3/13/18</a:t>
             </a:fld>
             <a:endParaRPr lang="en-US"/>
           </a:p>
@@ -1433,7 +1437,7 @@
           <a:p>
             <a:fld id="{88B6F594-2319-384E-B338-97933ED39875}" type="datetimeFigureOut">
               <a:rPr lang="en-US" smtClean="0"/>
-              <a:t>3/12/18</a:t>
+              <a:t>3/13/18</a:t>
             </a:fld>
             <a:endParaRPr lang="en-US"/>
           </a:p>
@@ -1845,7 +1849,7 @@
           <a:p>
             <a:fld id="{88B6F594-2319-384E-B338-97933ED39875}" type="datetimeFigureOut">
               <a:rPr lang="en-US" smtClean="0"/>
-              <a:t>3/12/18</a:t>
+              <a:t>3/13/18</a:t>
             </a:fld>
             <a:endParaRPr lang="en-US"/>
           </a:p>
@@ -1986,7 +1990,7 @@
           <a:p>
             <a:fld id="{88B6F594-2319-384E-B338-97933ED39875}" type="datetimeFigureOut">
               <a:rPr lang="en-US" smtClean="0"/>
-              <a:t>3/12/18</a:t>
+              <a:t>3/13/18</a:t>
             </a:fld>
             <a:endParaRPr lang="en-US"/>
           </a:p>
@@ -2099,7 +2103,7 @@
           <a:p>
             <a:fld id="{88B6F594-2319-384E-B338-97933ED39875}" type="datetimeFigureOut">
               <a:rPr lang="en-US" smtClean="0"/>
-              <a:t>3/12/18</a:t>
+              <a:t>3/13/18</a:t>
             </a:fld>
             <a:endParaRPr lang="en-US"/>
           </a:p>
@@ -2410,7 +2414,7 @@
           <a:p>
             <a:fld id="{88B6F594-2319-384E-B338-97933ED39875}" type="datetimeFigureOut">
               <a:rPr lang="en-US" smtClean="0"/>
-              <a:t>3/12/18</a:t>
+              <a:t>3/13/18</a:t>
             </a:fld>
             <a:endParaRPr lang="en-US"/>
           </a:p>
@@ -2698,7 +2702,7 @@
           <a:p>
             <a:fld id="{88B6F594-2319-384E-B338-97933ED39875}" type="datetimeFigureOut">
               <a:rPr lang="en-US" smtClean="0"/>
-              <a:t>3/12/18</a:t>
+              <a:t>3/13/18</a:t>
             </a:fld>
             <a:endParaRPr lang="en-US"/>
           </a:p>
@@ -2939,7 +2943,7 @@
           <a:p>
             <a:fld id="{88B6F594-2319-384E-B338-97933ED39875}" type="datetimeFigureOut">
               <a:rPr lang="en-US" smtClean="0"/>
-              <a:t>3/12/18</a:t>
+              <a:t>3/13/18</a:t>
             </a:fld>
             <a:endParaRPr lang="en-US"/>
           </a:p>
@@ -3403,7 +3407,7 @@
           <a:lstStyle/>
           <a:p>
             <a:r>
-              <a:rPr lang="en-US"/>
+              <a:rPr lang="en-US" dirty="0"/>
               <a:t>http://qconsf2017intro.container.training/#332</a:t>
             </a:r>
           </a:p>
@@ -4191,14 +4195,14 @@
           <a:lstStyle/>
           <a:p>
             <a:r>
-              <a:rPr lang="en-US" dirty="0"/>
+              <a:rPr lang="en-US" b="1" dirty="0"/>
               <a:t>vi </a:t>
             </a:r>
             <a:r>
-              <a:rPr lang="en-US" dirty="0" err="1"/>
+              <a:rPr lang="en-US" b="1" dirty="0" err="1"/>
               <a:t>dockerfile</a:t>
             </a:r>
-            <a:endParaRPr lang="en-US" dirty="0"/>
+            <a:endParaRPr lang="en-US" b="1" dirty="0"/>
           </a:p>
           <a:p>
             <a:pPr lvl="1"/>
@@ -4247,63 +4251,63 @@
           </a:p>
           <a:p>
             <a:r>
-              <a:rPr lang="en-US" dirty="0" err="1"/>
+              <a:rPr lang="en-US" b="1" dirty="0" err="1"/>
               <a:t>docker</a:t>
             </a:r>
             <a:r>
-              <a:rPr lang="en-US" dirty="0"/>
+              <a:rPr lang="en-US" b="1" dirty="0"/>
               <a:t> build -t </a:t>
             </a:r>
             <a:r>
-              <a:rPr lang="en-US" dirty="0" err="1"/>
+              <a:rPr lang="en-US" b="1" dirty="0" err="1"/>
               <a:t>figlet</a:t>
             </a:r>
             <a:r>
-              <a:rPr lang="en-US" dirty="0"/>
+              <a:rPr lang="en-US" b="1" dirty="0"/>
               <a:t> .</a:t>
             </a:r>
           </a:p>
           <a:p>
             <a:r>
-              <a:rPr lang="en-US" dirty="0" err="1"/>
+              <a:rPr lang="en-US" b="1" dirty="0" err="1"/>
               <a:t>docker</a:t>
             </a:r>
             <a:r>
-              <a:rPr lang="en-US" dirty="0"/>
+              <a:rPr lang="en-US" b="1" dirty="0"/>
               <a:t> images</a:t>
             </a:r>
           </a:p>
           <a:p>
             <a:r>
-              <a:rPr lang="en-US" dirty="0" err="1"/>
+              <a:rPr lang="en-US" b="1" dirty="0" err="1"/>
               <a:t>docker</a:t>
             </a:r>
             <a:r>
-              <a:rPr lang="en-US" dirty="0"/>
+              <a:rPr lang="en-US" b="1" dirty="0"/>
               <a:t> run -</a:t>
             </a:r>
             <a:r>
-              <a:rPr lang="en-US" dirty="0" err="1"/>
+              <a:rPr lang="en-US" b="1" dirty="0" err="1"/>
               <a:t>ti</a:t>
             </a:r>
             <a:r>
-              <a:rPr lang="en-US" dirty="0"/>
+              <a:rPr lang="en-US" b="1" dirty="0"/>
               <a:t> </a:t>
             </a:r>
             <a:r>
-              <a:rPr lang="en-US" dirty="0" err="1"/>
+              <a:rPr lang="en-US" b="1" dirty="0" err="1"/>
               <a:t>figlet</a:t>
             </a:r>
             <a:r>
-              <a:rPr lang="en-US" dirty="0"/>
+              <a:rPr lang="en-US" b="1" dirty="0"/>
               <a:t> </a:t>
             </a:r>
             <a:r>
-              <a:rPr lang="en-US" dirty="0" err="1"/>
+              <a:rPr lang="en-US" b="1" dirty="0" err="1"/>
               <a:t>figlet</a:t>
             </a:r>
             <a:r>
-              <a:rPr lang="en-US" dirty="0"/>
+              <a:rPr lang="en-US" b="1" dirty="0"/>
               <a:t> HELLO</a:t>
             </a:r>
           </a:p>
@@ -4555,44 +4559,44 @@
           </a:p>
           <a:p>
             <a:r>
-              <a:rPr lang="en-US" dirty="0" err="1"/>
+              <a:rPr lang="en-US" b="1" dirty="0" err="1"/>
               <a:t>docker</a:t>
             </a:r>
             <a:r>
-              <a:rPr lang="en-US" dirty="0"/>
+              <a:rPr lang="en-US" b="1" dirty="0"/>
               <a:t> build -t </a:t>
             </a:r>
             <a:r>
-              <a:rPr lang="en-US" dirty="0" err="1"/>
+              <a:rPr lang="en-US" b="1" dirty="0" err="1"/>
               <a:t>figlet-cmd</a:t>
             </a:r>
             <a:r>
-              <a:rPr lang="en-US" dirty="0"/>
+              <a:rPr lang="en-US" b="1" dirty="0"/>
               <a:t> .</a:t>
             </a:r>
           </a:p>
           <a:p>
             <a:r>
-              <a:rPr lang="en-US" dirty="0" err="1"/>
+              <a:rPr lang="en-US" b="1" dirty="0" err="1"/>
               <a:t>docker</a:t>
             </a:r>
             <a:r>
-              <a:rPr lang="en-US" dirty="0"/>
+              <a:rPr lang="en-US" b="1" dirty="0"/>
               <a:t> run -</a:t>
             </a:r>
             <a:r>
-              <a:rPr lang="en-US" dirty="0" err="1"/>
+              <a:rPr lang="en-US" b="1" dirty="0" err="1"/>
               <a:t>ti</a:t>
             </a:r>
             <a:r>
-              <a:rPr lang="en-US" dirty="0"/>
+              <a:rPr lang="en-US" b="1" dirty="0"/>
               <a:t> </a:t>
             </a:r>
             <a:r>
-              <a:rPr lang="en-US" dirty="0" err="1"/>
+              <a:rPr lang="en-US" b="1" dirty="0" err="1"/>
               <a:t>figlet-cmd</a:t>
             </a:r>
-            <a:endParaRPr lang="en-US" dirty="0"/>
+            <a:endParaRPr lang="en-US" b="1" dirty="0"/>
           </a:p>
           <a:p>
             <a:endParaRPr lang="en-US" dirty="0"/>
@@ -5578,18 +5582,18 @@
           <a:p>
             <a:pPr lvl="1"/>
             <a:r>
-              <a:rPr lang="en-US" dirty="0" err="1"/>
+              <a:rPr lang="en-US" b="1" dirty="0" err="1"/>
               <a:t>mkdir</a:t>
             </a:r>
             <a:r>
-              <a:rPr lang="en-US" dirty="0"/>
+              <a:rPr lang="en-US" b="1" dirty="0"/>
               <a:t> </a:t>
             </a:r>
             <a:r>
-              <a:rPr lang="en-US" dirty="0" err="1"/>
+              <a:rPr lang="en-US" b="1" dirty="0" err="1"/>
               <a:t>nginx-conf</a:t>
             </a:r>
-            <a:endParaRPr lang="en-US" dirty="0"/>
+            <a:endParaRPr lang="en-US" b="1" dirty="0"/>
           </a:p>
           <a:p>
             <a:r>
@@ -5600,22 +5604,22 @@
           <a:p>
             <a:pPr lvl="1"/>
             <a:r>
-              <a:rPr lang="en-US" dirty="0"/>
+              <a:rPr lang="en-US" b="1" dirty="0"/>
               <a:t>echo "HELLO PRESIDIO" &gt;&gt; </a:t>
             </a:r>
             <a:r>
-              <a:rPr lang="en-US" dirty="0" err="1"/>
+              <a:rPr lang="en-US" b="1" dirty="0" err="1"/>
               <a:t>nginx-conf</a:t>
             </a:r>
             <a:r>
-              <a:rPr lang="en-US" dirty="0"/>
+              <a:rPr lang="en-US" b="1" dirty="0"/>
               <a:t>/</a:t>
             </a:r>
             <a:r>
-              <a:rPr lang="en-US" dirty="0" err="1"/>
+              <a:rPr lang="en-US" b="1" dirty="0" err="1"/>
               <a:t>index.html</a:t>
             </a:r>
-            <a:endParaRPr lang="en-US" dirty="0"/>
+            <a:endParaRPr lang="en-US" b="1" dirty="0"/>
           </a:p>
           <a:p>
             <a:r>
@@ -5634,27 +5638,27 @@
           <a:p>
             <a:pPr lvl="1"/>
             <a:r>
-              <a:rPr lang="en-US" dirty="0" err="1"/>
+              <a:rPr lang="en-US" b="1" dirty="0" err="1"/>
               <a:t>docker</a:t>
             </a:r>
             <a:r>
-              <a:rPr lang="en-US" dirty="0"/>
+              <a:rPr lang="en-US" b="1" dirty="0"/>
               <a:t> build -f </a:t>
             </a:r>
             <a:r>
-              <a:rPr lang="en-US" dirty="0" err="1"/>
+              <a:rPr lang="en-US" b="1" dirty="0" err="1"/>
               <a:t>dockerfile-nginx</a:t>
             </a:r>
             <a:r>
-              <a:rPr lang="en-US" dirty="0"/>
+              <a:rPr lang="en-US" b="1" dirty="0"/>
               <a:t> -t </a:t>
             </a:r>
             <a:r>
-              <a:rPr lang="en-US" dirty="0" err="1"/>
+              <a:rPr lang="en-US" b="1" dirty="0" err="1"/>
               <a:t>mynginx</a:t>
             </a:r>
             <a:r>
-              <a:rPr lang="en-US" dirty="0"/>
+              <a:rPr lang="en-US" b="1" dirty="0"/>
               <a:t> .</a:t>
             </a:r>
           </a:p>
@@ -5747,18 +5751,18 @@
           <a:p>
             <a:pPr lvl="1"/>
             <a:r>
-              <a:rPr lang="en-US" dirty="0" err="1"/>
+              <a:rPr lang="en-US" b="1" dirty="0" err="1"/>
               <a:t>docker</a:t>
             </a:r>
             <a:r>
-              <a:rPr lang="en-US" dirty="0"/>
+              <a:rPr lang="en-US" b="1" dirty="0"/>
               <a:t> run -d -P --name web1 </a:t>
             </a:r>
             <a:r>
-              <a:rPr lang="en-US" dirty="0" err="1"/>
+              <a:rPr lang="en-US" b="1" dirty="0" err="1"/>
               <a:t>my_nginx:latest</a:t>
             </a:r>
-            <a:endParaRPr lang="en-US" dirty="0"/>
+            <a:endParaRPr lang="en-US" b="1" dirty="0"/>
           </a:p>
           <a:p>
             <a:r>
@@ -5769,11 +5773,11 @@
           <a:p>
             <a:pPr lvl="1"/>
             <a:r>
-              <a:rPr lang="en-US" dirty="0" err="1"/>
+              <a:rPr lang="en-US" b="1" dirty="0" err="1"/>
               <a:t>docker</a:t>
             </a:r>
             <a:r>
-              <a:rPr lang="en-US" dirty="0"/>
+              <a:rPr lang="en-US" b="1" dirty="0"/>
               <a:t> port web1</a:t>
             </a:r>
           </a:p>
@@ -5786,7 +5790,7 @@
           <a:p>
             <a:pPr lvl="1"/>
             <a:r>
-              <a:rPr lang="en-US" dirty="0"/>
+              <a:rPr lang="en-US" b="1" dirty="0"/>
               <a:t>http://localhost:&lt;PORT&gt;</a:t>
             </a:r>
           </a:p>
@@ -5886,11 +5890,11 @@
           <a:p>
             <a:pPr lvl="1"/>
             <a:r>
-              <a:rPr lang="en-US" dirty="0" err="1"/>
+              <a:rPr lang="en-US" b="1" dirty="0" err="1"/>
               <a:t>docker</a:t>
             </a:r>
             <a:r>
-              <a:rPr lang="en-US" dirty="0"/>
+              <a:rPr lang="en-US" b="1" dirty="0"/>
               <a:t> login</a:t>
             </a:r>
           </a:p>
@@ -5903,31 +5907,31 @@
           <a:p>
             <a:pPr lvl="1"/>
             <a:r>
-              <a:rPr lang="en-US" dirty="0" err="1"/>
+              <a:rPr lang="en-US" b="1" dirty="0" err="1"/>
               <a:t>docker</a:t>
             </a:r>
             <a:r>
-              <a:rPr lang="en-US" dirty="0"/>
+              <a:rPr lang="en-US" b="1" dirty="0"/>
               <a:t> tag </a:t>
             </a:r>
             <a:r>
-              <a:rPr lang="en-US" dirty="0" err="1"/>
+              <a:rPr lang="en-US" b="1" dirty="0" err="1"/>
               <a:t>mynginx</a:t>
             </a:r>
             <a:r>
-              <a:rPr lang="en-US" dirty="0"/>
+              <a:rPr lang="en-US" b="1" dirty="0"/>
               <a:t> </a:t>
             </a:r>
             <a:r>
-              <a:rPr lang="en-US" i="1" dirty="0" err="1"/>
+              <a:rPr lang="en-US" b="1" i="1" dirty="0" err="1"/>
               <a:t>dockehub_username</a:t>
             </a:r>
             <a:r>
-              <a:rPr lang="en-US" i="1" dirty="0"/>
+              <a:rPr lang="en-US" b="1" i="1" dirty="0"/>
               <a:t>/</a:t>
             </a:r>
             <a:r>
-              <a:rPr lang="en-US" dirty="0"/>
+              <a:rPr lang="en-US" b="1" dirty="0"/>
               <a:t>test_nginx:v1</a:t>
             </a:r>
           </a:p>
@@ -5940,23 +5944,23 @@
           <a:p>
             <a:pPr lvl="1"/>
             <a:r>
-              <a:rPr lang="en-US" dirty="0" err="1"/>
+              <a:rPr lang="en-US" b="1" dirty="0" err="1"/>
               <a:t>docker</a:t>
             </a:r>
             <a:r>
-              <a:rPr lang="en-US" dirty="0"/>
+              <a:rPr lang="en-US" b="1" dirty="0"/>
               <a:t> push </a:t>
             </a:r>
             <a:r>
-              <a:rPr lang="en-US" i="1" dirty="0" err="1"/>
+              <a:rPr lang="en-US" b="1" i="1" dirty="0" err="1"/>
               <a:t>dockehub_username</a:t>
             </a:r>
             <a:r>
-              <a:rPr lang="en-US" i="1" dirty="0"/>
+              <a:rPr lang="en-US" b="1" i="1" dirty="0"/>
               <a:t>/</a:t>
             </a:r>
             <a:r>
-              <a:rPr lang="en-US" dirty="0"/>
+              <a:rPr lang="en-US" b="1" dirty="0"/>
               <a:t>test_nginx:v1</a:t>
             </a:r>
           </a:p>
@@ -5969,31 +5973,31 @@
           <a:p>
             <a:pPr lvl="1"/>
             <a:r>
-              <a:rPr lang="en-US" dirty="0" err="1"/>
+              <a:rPr lang="en-US" b="1" dirty="0" err="1"/>
               <a:t>docker</a:t>
             </a:r>
             <a:r>
-              <a:rPr lang="en-US" dirty="0"/>
+              <a:rPr lang="en-US" b="1" dirty="0"/>
               <a:t> image </a:t>
             </a:r>
             <a:r>
-              <a:rPr lang="en-US" dirty="0" err="1"/>
+              <a:rPr lang="en-US" b="1" dirty="0" err="1"/>
               <a:t>rm</a:t>
             </a:r>
             <a:r>
-              <a:rPr lang="en-US" dirty="0"/>
+              <a:rPr lang="en-US" b="1" dirty="0"/>
               <a:t> </a:t>
             </a:r>
             <a:r>
-              <a:rPr lang="en-US" i="1" dirty="0" err="1"/>
+              <a:rPr lang="en-US" b="1" i="1" dirty="0" err="1"/>
               <a:t>dockehub_username</a:t>
             </a:r>
             <a:r>
-              <a:rPr lang="en-US" i="1" dirty="0"/>
+              <a:rPr lang="en-US" b="1" i="1" dirty="0"/>
               <a:t> </a:t>
             </a:r>
             <a:r>
-              <a:rPr lang="en-US" dirty="0"/>
+              <a:rPr lang="en-US" b="1" dirty="0"/>
               <a:t>/test_nginx:v1</a:t>
             </a:r>
           </a:p>
@@ -6006,11 +6010,11 @@
           <a:p>
             <a:pPr lvl="1"/>
             <a:r>
-              <a:rPr lang="en-US" dirty="0" err="1"/>
+              <a:rPr lang="en-US" b="1" dirty="0" err="1"/>
               <a:t>docker</a:t>
             </a:r>
             <a:r>
-              <a:rPr lang="en-US" dirty="0"/>
+              <a:rPr lang="en-US" b="1" dirty="0"/>
               <a:t> images</a:t>
             </a:r>
           </a:p>
@@ -6023,23 +6027,23 @@
           <a:p>
             <a:pPr lvl="1"/>
             <a:r>
-              <a:rPr lang="en-US" dirty="0" err="1"/>
+              <a:rPr lang="en-US" b="1" dirty="0" err="1"/>
               <a:t>docker</a:t>
             </a:r>
             <a:r>
-              <a:rPr lang="en-US" dirty="0"/>
+              <a:rPr lang="en-US" b="1" dirty="0"/>
               <a:t> pull </a:t>
             </a:r>
             <a:r>
-              <a:rPr lang="en-US" i="1" dirty="0" err="1"/>
+              <a:rPr lang="en-US" b="1" i="1" dirty="0" err="1"/>
               <a:t>dockehub_username</a:t>
             </a:r>
             <a:r>
-              <a:rPr lang="en-US" i="1" dirty="0"/>
+              <a:rPr lang="en-US" b="1" i="1" dirty="0"/>
               <a:t> </a:t>
             </a:r>
             <a:r>
-              <a:rPr lang="en-US" dirty="0"/>
+              <a:rPr lang="en-US" b="1" dirty="0"/>
               <a:t>/test_nginx:v1</a:t>
             </a:r>
           </a:p>
@@ -6813,8 +6817,44 @@
               <a:t>The volume exist Docker’s storage directory on the host machine.</a:t>
             </a:r>
           </a:p>
-        </p:txBody>
-      </p:sp>
+          <a:p>
+            <a:pPr marL="0" indent="0">
+              <a:buNone/>
+            </a:pPr>
+            <a:endParaRPr lang="en-US" dirty="0"/>
+          </a:p>
+        </p:txBody>
+      </p:sp>
+      <p:pic>
+        <p:nvPicPr>
+          <p:cNvPr id="5" name="Picture 4">
+            <a:extLst>
+              <a:ext uri="{FF2B5EF4-FFF2-40B4-BE49-F238E27FC236}">
+                <a16:creationId xmlns:a16="http://schemas.microsoft.com/office/drawing/2014/main" id="{B1DFE32B-B2AD-E54B-A5C2-F0455232B403}"/>
+              </a:ext>
+            </a:extLst>
+          </p:cNvPr>
+          <p:cNvPicPr>
+            <a:picLocks noChangeAspect="1"/>
+          </p:cNvPicPr>
+          <p:nvPr/>
+        </p:nvPicPr>
+        <p:blipFill>
+          <a:blip r:embed="rId2"/>
+          <a:stretch>
+            <a:fillRect/>
+          </a:stretch>
+        </p:blipFill>
+        <p:spPr>
+          <a:xfrm>
+            <a:off x="838200" y="1825625"/>
+            <a:ext cx="10124090" cy="4165272"/>
+          </a:xfrm>
+          <a:prstGeom prst="rect">
+            <a:avLst/>
+          </a:prstGeom>
+        </p:spPr>
+      </p:pic>
     </p:spTree>
     <p:extLst>
       <p:ext uri="{BB962C8B-B14F-4D97-AF65-F5344CB8AC3E}">
@@ -6825,6 +6865,81 @@
   <p:clrMapOvr>
     <a:masterClrMapping/>
   </p:clrMapOvr>
+  <p:timing>
+    <p:tnLst>
+      <p:par>
+        <p:cTn id="1" dur="indefinite" restart="never" nodeType="tmRoot">
+          <p:childTnLst>
+            <p:seq concurrent="1" nextAc="seek">
+              <p:cTn id="2" dur="indefinite" nodeType="mainSeq">
+                <p:childTnLst>
+                  <p:par>
+                    <p:cTn id="3" fill="hold">
+                      <p:stCondLst>
+                        <p:cond delay="indefinite"/>
+                      </p:stCondLst>
+                      <p:childTnLst>
+                        <p:par>
+                          <p:cTn id="4" fill="hold">
+                            <p:stCondLst>
+                              <p:cond delay="0"/>
+                            </p:stCondLst>
+                            <p:childTnLst>
+                              <p:par>
+                                <p:cTn id="5" presetID="1" presetClass="entr" presetSubtype="0" fill="hold" nodeType="clickEffect">
+                                  <p:stCondLst>
+                                    <p:cond delay="0"/>
+                                  </p:stCondLst>
+                                  <p:childTnLst>
+                                    <p:set>
+                                      <p:cBhvr>
+                                        <p:cTn id="6" dur="1" fill="hold">
+                                          <p:stCondLst>
+                                            <p:cond delay="0"/>
+                                          </p:stCondLst>
+                                        </p:cTn>
+                                        <p:tgtEl>
+                                          <p:spTgt spid="5"/>
+                                        </p:tgtEl>
+                                        <p:attrNameLst>
+                                          <p:attrName>style.visibility</p:attrName>
+                                        </p:attrNameLst>
+                                      </p:cBhvr>
+                                      <p:to>
+                                        <p:strVal val="visible"/>
+                                      </p:to>
+                                    </p:set>
+                                  </p:childTnLst>
+                                </p:cTn>
+                              </p:par>
+                            </p:childTnLst>
+                          </p:cTn>
+                        </p:par>
+                      </p:childTnLst>
+                    </p:cTn>
+                  </p:par>
+                </p:childTnLst>
+              </p:cTn>
+              <p:prevCondLst>
+                <p:cond evt="onPrev" delay="0">
+                  <p:tgtEl>
+                    <p:sldTgt/>
+                  </p:tgtEl>
+                </p:cond>
+              </p:prevCondLst>
+              <p:nextCondLst>
+                <p:cond evt="onNext" delay="0">
+                  <p:tgtEl>
+                    <p:sldTgt/>
+                  </p:tgtEl>
+                </p:cond>
+              </p:nextCondLst>
+            </p:seq>
+          </p:childTnLst>
+        </p:cTn>
+      </p:par>
+    </p:tnLst>
+  </p:timing>
 </p:sld>
 </file>
 
@@ -7288,10 +7403,688 @@
           </a:p>
         </p:txBody>
       </p:sp>
+      <p:pic>
+        <p:nvPicPr>
+          <p:cNvPr id="5" name="Picture 4">
+            <a:extLst>
+              <a:ext uri="{FF2B5EF4-FFF2-40B4-BE49-F238E27FC236}">
+                <a16:creationId xmlns:a16="http://schemas.microsoft.com/office/drawing/2014/main" id="{3BC34E7B-F285-164C-8AAA-9F1A70EEC174}"/>
+              </a:ext>
+            </a:extLst>
+          </p:cNvPr>
+          <p:cNvPicPr>
+            <a:picLocks noChangeAspect="1"/>
+          </p:cNvPicPr>
+          <p:nvPr/>
+        </p:nvPicPr>
+        <p:blipFill>
+          <a:blip r:embed="rId2"/>
+          <a:stretch>
+            <a:fillRect/>
+          </a:stretch>
+        </p:blipFill>
+        <p:spPr>
+          <a:xfrm>
+            <a:off x="385763" y="1690688"/>
+            <a:ext cx="11396587" cy="4621212"/>
+          </a:xfrm>
+          <a:prstGeom prst="rect">
+            <a:avLst/>
+          </a:prstGeom>
+        </p:spPr>
+      </p:pic>
     </p:spTree>
     <p:extLst>
       <p:ext uri="{BB962C8B-B14F-4D97-AF65-F5344CB8AC3E}">
         <p14:creationId xmlns:p14="http://schemas.microsoft.com/office/powerpoint/2010/main" val="4178305918"/>
+      </p:ext>
+    </p:extLst>
+  </p:cSld>
+  <p:clrMapOvr>
+    <a:masterClrMapping/>
+  </p:clrMapOvr>
+  <p:timing>
+    <p:tnLst>
+      <p:par>
+        <p:cTn id="1" dur="indefinite" restart="never" nodeType="tmRoot">
+          <p:childTnLst>
+            <p:seq concurrent="1" nextAc="seek">
+              <p:cTn id="2" dur="indefinite" nodeType="mainSeq">
+                <p:childTnLst>
+                  <p:par>
+                    <p:cTn id="3" fill="hold">
+                      <p:stCondLst>
+                        <p:cond delay="indefinite"/>
+                      </p:stCondLst>
+                      <p:childTnLst>
+                        <p:par>
+                          <p:cTn id="4" fill="hold">
+                            <p:stCondLst>
+                              <p:cond delay="0"/>
+                            </p:stCondLst>
+                            <p:childTnLst>
+                              <p:par>
+                                <p:cTn id="5" presetID="1" presetClass="entr" presetSubtype="0" fill="hold" nodeType="clickEffect">
+                                  <p:stCondLst>
+                                    <p:cond delay="0"/>
+                                  </p:stCondLst>
+                                  <p:childTnLst>
+                                    <p:set>
+                                      <p:cBhvr>
+                                        <p:cTn id="6" dur="1" fill="hold">
+                                          <p:stCondLst>
+                                            <p:cond delay="0"/>
+                                          </p:stCondLst>
+                                        </p:cTn>
+                                        <p:tgtEl>
+                                          <p:spTgt spid="5"/>
+                                        </p:tgtEl>
+                                        <p:attrNameLst>
+                                          <p:attrName>style.visibility</p:attrName>
+                                        </p:attrNameLst>
+                                      </p:cBhvr>
+                                      <p:to>
+                                        <p:strVal val="visible"/>
+                                      </p:to>
+                                    </p:set>
+                                  </p:childTnLst>
+                                </p:cTn>
+                              </p:par>
+                            </p:childTnLst>
+                          </p:cTn>
+                        </p:par>
+                      </p:childTnLst>
+                    </p:cTn>
+                  </p:par>
+                </p:childTnLst>
+              </p:cTn>
+              <p:prevCondLst>
+                <p:cond evt="onPrev" delay="0">
+                  <p:tgtEl>
+                    <p:sldTgt/>
+                  </p:tgtEl>
+                </p:cond>
+              </p:prevCondLst>
+              <p:nextCondLst>
+                <p:cond evt="onNext" delay="0">
+                  <p:tgtEl>
+                    <p:sldTgt/>
+                  </p:tgtEl>
+                </p:cond>
+              </p:nextCondLst>
+            </p:seq>
+          </p:childTnLst>
+        </p:cTn>
+      </p:par>
+    </p:tnLst>
+  </p:timing>
+</p:sld>
+</file>
+
+<file path=ppt/slides/slide32.xml><?xml version="1.0" encoding="utf-8"?>
+<p:sld xmlns:a="http://schemas.openxmlformats.org/drawingml/2006/main" xmlns:r="http://schemas.openxmlformats.org/officeDocument/2006/relationships" xmlns:p="http://schemas.openxmlformats.org/presentationml/2006/main">
+  <p:cSld>
+    <p:spTree>
+      <p:nvGrpSpPr>
+        <p:cNvPr id="1" name=""/>
+        <p:cNvGrpSpPr/>
+        <p:nvPr/>
+      </p:nvGrpSpPr>
+      <p:grpSpPr>
+        <a:xfrm>
+          <a:off x="0" y="0"/>
+          <a:ext cx="0" cy="0"/>
+          <a:chOff x="0" y="0"/>
+          <a:chExt cx="0" cy="0"/>
+        </a:xfrm>
+      </p:grpSpPr>
+      <p:sp>
+        <p:nvSpPr>
+          <p:cNvPr id="2" name="Title 1">
+            <a:extLst>
+              <a:ext uri="{FF2B5EF4-FFF2-40B4-BE49-F238E27FC236}">
+                <a16:creationId xmlns:a16="http://schemas.microsoft.com/office/drawing/2014/main" id="{80B6736E-E47F-494E-A4F0-2E518E5CCFD1}"/>
+              </a:ext>
+            </a:extLst>
+          </p:cNvPr>
+          <p:cNvSpPr>
+            <a:spLocks noGrp="1"/>
+          </p:cNvSpPr>
+          <p:nvPr>
+            <p:ph type="title"/>
+          </p:nvPr>
+        </p:nvSpPr>
+        <p:spPr/>
+        <p:txBody>
+          <a:bodyPr/>
+          <a:lstStyle/>
+          <a:p>
+            <a:r>
+              <a:rPr lang="en-US" dirty="0"/>
+              <a:t>Containers and bindings</a:t>
+            </a:r>
+          </a:p>
+        </p:txBody>
+      </p:sp>
+      <p:sp>
+        <p:nvSpPr>
+          <p:cNvPr id="3" name="Content Placeholder 2">
+            <a:extLst>
+              <a:ext uri="{FF2B5EF4-FFF2-40B4-BE49-F238E27FC236}">
+                <a16:creationId xmlns:a16="http://schemas.microsoft.com/office/drawing/2014/main" id="{FEC451AE-1A44-FC4F-A9AD-E65BBEFA17AF}"/>
+              </a:ext>
+            </a:extLst>
+          </p:cNvPr>
+          <p:cNvSpPr>
+            <a:spLocks noGrp="1"/>
+          </p:cNvSpPr>
+          <p:nvPr>
+            <p:ph idx="1"/>
+          </p:nvPr>
+        </p:nvSpPr>
+        <p:spPr>
+          <a:xfrm>
+            <a:off x="838200" y="1492469"/>
+            <a:ext cx="10515600" cy="4684494"/>
+          </a:xfrm>
+        </p:spPr>
+        <p:txBody>
+          <a:bodyPr>
+            <a:normAutofit fontScale="85000" lnSpcReduction="20000"/>
+          </a:bodyPr>
+          <a:lstStyle/>
+          <a:p>
+            <a:r>
+              <a:rPr lang="en-US" dirty="0"/>
+              <a:t>Create a directory.    </a:t>
+            </a:r>
+          </a:p>
+          <a:p>
+            <a:pPr lvl="1"/>
+            <a:r>
+              <a:rPr lang="en-US" b="1" dirty="0" err="1"/>
+              <a:t>mkdir</a:t>
+            </a:r>
+            <a:r>
+              <a:rPr lang="en-US" b="1" dirty="0"/>
+              <a:t> </a:t>
+            </a:r>
+            <a:r>
+              <a:rPr lang="en-US" b="1" dirty="0" err="1"/>
+              <a:t>my_bindings</a:t>
+            </a:r>
+            <a:endParaRPr lang="en-US" b="1" dirty="0"/>
+          </a:p>
+          <a:p>
+            <a:r>
+              <a:rPr lang="en-US" dirty="0"/>
+              <a:t>Create a file inside the directory.    </a:t>
+            </a:r>
+          </a:p>
+          <a:p>
+            <a:pPr lvl="1"/>
+            <a:r>
+              <a:rPr lang="en-US" b="1" dirty="0"/>
+              <a:t>echo "bind test" &gt;&gt; </a:t>
+            </a:r>
+            <a:r>
+              <a:rPr lang="en-US" b="1" dirty="0" err="1"/>
+              <a:t>my_bindings</a:t>
+            </a:r>
+            <a:r>
+              <a:rPr lang="en-US" b="1" dirty="0"/>
+              <a:t>/</a:t>
+            </a:r>
+            <a:r>
+              <a:rPr lang="en-US" b="1" dirty="0" err="1"/>
+              <a:t>test.txt</a:t>
+            </a:r>
+            <a:endParaRPr lang="en-US" dirty="0"/>
+          </a:p>
+          <a:p>
+            <a:r>
+              <a:rPr lang="en-US" dirty="0"/>
+              <a:t>Run a container.   </a:t>
+            </a:r>
+          </a:p>
+          <a:p>
+            <a:pPr lvl="1"/>
+            <a:r>
+              <a:rPr lang="en-US" dirty="0"/>
+              <a:t> </a:t>
+            </a:r>
+            <a:r>
+              <a:rPr lang="en-US" b="1" dirty="0" err="1"/>
+              <a:t>docker</a:t>
+            </a:r>
+            <a:r>
+              <a:rPr lang="en-US" b="1" dirty="0"/>
+              <a:t> run -it --</a:t>
+            </a:r>
+            <a:r>
+              <a:rPr lang="en-US" b="1" dirty="0" err="1"/>
+              <a:t>rm</a:t>
+            </a:r>
+            <a:r>
+              <a:rPr lang="en-US" b="1" dirty="0"/>
+              <a:t> -v </a:t>
+            </a:r>
+            <a:r>
+              <a:rPr lang="en-US" b="1" dirty="0" err="1"/>
+              <a:t>my_bindings</a:t>
+            </a:r>
+            <a:r>
+              <a:rPr lang="en-US" b="1" dirty="0"/>
+              <a:t>/:/</a:t>
+            </a:r>
+            <a:r>
+              <a:rPr lang="en-US" b="1" dirty="0" err="1"/>
+              <a:t>new_vol</a:t>
+            </a:r>
+            <a:r>
+              <a:rPr lang="en-US" b="1" dirty="0"/>
+              <a:t> --name test_bind_1 alpine </a:t>
+            </a:r>
+            <a:r>
+              <a:rPr lang="en-US" b="1" dirty="0" err="1"/>
+              <a:t>sh</a:t>
+            </a:r>
+            <a:endParaRPr lang="en-US" b="1" dirty="0"/>
+          </a:p>
+          <a:p>
+            <a:r>
+              <a:rPr lang="en-US" dirty="0"/>
+              <a:t>Inside the container verify the file.    </a:t>
+            </a:r>
+          </a:p>
+          <a:p>
+            <a:pPr lvl="1"/>
+            <a:r>
+              <a:rPr lang="en-US" b="1" dirty="0"/>
+              <a:t>cat </a:t>
+            </a:r>
+            <a:r>
+              <a:rPr lang="en-US" b="1" dirty="0" err="1"/>
+              <a:t>new_vol</a:t>
+            </a:r>
+            <a:r>
+              <a:rPr lang="en-US" b="1" dirty="0"/>
+              <a:t>/</a:t>
+            </a:r>
+            <a:r>
+              <a:rPr lang="en-US" b="1" dirty="0" err="1"/>
+              <a:t>test.txt</a:t>
+            </a:r>
+            <a:endParaRPr lang="en-US" b="1" dirty="0"/>
+          </a:p>
+          <a:p>
+            <a:r>
+              <a:rPr lang="en-US" dirty="0"/>
+              <a:t>Edit the file.    </a:t>
+            </a:r>
+          </a:p>
+          <a:p>
+            <a:pPr lvl="1"/>
+            <a:r>
+              <a:rPr lang="en-US" b="1" dirty="0"/>
+              <a:t>echo "Another line" &gt;&gt; </a:t>
+            </a:r>
+            <a:r>
+              <a:rPr lang="en-US" b="1" dirty="0" err="1"/>
+              <a:t>new_vol</a:t>
+            </a:r>
+            <a:r>
+              <a:rPr lang="en-US" b="1" dirty="0"/>
+              <a:t>/</a:t>
+            </a:r>
+            <a:r>
+              <a:rPr lang="en-US" b="1" dirty="0" err="1"/>
+              <a:t>test.txt</a:t>
+            </a:r>
+            <a:endParaRPr lang="en-US" b="1" dirty="0"/>
+          </a:p>
+          <a:p>
+            <a:r>
+              <a:rPr lang="en-US" dirty="0"/>
+              <a:t>Exit the container.    </a:t>
+            </a:r>
+          </a:p>
+          <a:p>
+            <a:pPr lvl="1"/>
+            <a:r>
+              <a:rPr lang="en-US" b="1" dirty="0"/>
+              <a:t>Exit</a:t>
+            </a:r>
+          </a:p>
+          <a:p>
+            <a:r>
+              <a:rPr lang="en-US" dirty="0"/>
+              <a:t>Check the file again.    </a:t>
+            </a:r>
+          </a:p>
+          <a:p>
+            <a:pPr lvl="1"/>
+            <a:r>
+              <a:rPr lang="en-US" b="1" dirty="0"/>
+              <a:t>cat </a:t>
+            </a:r>
+            <a:r>
+              <a:rPr lang="en-US" b="1" dirty="0" err="1"/>
+              <a:t>my_bindings</a:t>
+            </a:r>
+            <a:r>
+              <a:rPr lang="en-US" b="1" dirty="0"/>
+              <a:t>/</a:t>
+            </a:r>
+            <a:r>
+              <a:rPr lang="en-US" b="1" dirty="0" err="1"/>
+              <a:t>test.txt</a:t>
+            </a:r>
+            <a:endParaRPr lang="en-US" b="1" dirty="0"/>
+          </a:p>
+        </p:txBody>
+      </p:sp>
+    </p:spTree>
+    <p:extLst>
+      <p:ext uri="{BB962C8B-B14F-4D97-AF65-F5344CB8AC3E}">
+        <p14:creationId xmlns:p14="http://schemas.microsoft.com/office/powerpoint/2010/main" val="1204693452"/>
+      </p:ext>
+    </p:extLst>
+  </p:cSld>
+  <p:clrMapOvr>
+    <a:masterClrMapping/>
+  </p:clrMapOvr>
+</p:sld>
+</file>
+
+<file path=ppt/slides/slide33.xml><?xml version="1.0" encoding="utf-8"?>
+<p:sld xmlns:a="http://schemas.openxmlformats.org/drawingml/2006/main" xmlns:r="http://schemas.openxmlformats.org/officeDocument/2006/relationships" xmlns:p="http://schemas.openxmlformats.org/presentationml/2006/main">
+  <p:cSld>
+    <p:spTree>
+      <p:nvGrpSpPr>
+        <p:cNvPr id="1" name=""/>
+        <p:cNvGrpSpPr/>
+        <p:nvPr/>
+      </p:nvGrpSpPr>
+      <p:grpSpPr>
+        <a:xfrm>
+          <a:off x="0" y="0"/>
+          <a:ext cx="0" cy="0"/>
+          <a:chOff x="0" y="0"/>
+          <a:chExt cx="0" cy="0"/>
+        </a:xfrm>
+      </p:grpSpPr>
+      <p:pic>
+        <p:nvPicPr>
+          <p:cNvPr id="3" name="Picture 2">
+            <a:extLst>
+              <a:ext uri="{FF2B5EF4-FFF2-40B4-BE49-F238E27FC236}">
+                <a16:creationId xmlns:a16="http://schemas.microsoft.com/office/drawing/2014/main" id="{6510D761-1D6D-8C43-85DD-11B11E2A2136}"/>
+              </a:ext>
+            </a:extLst>
+          </p:cNvPr>
+          <p:cNvPicPr>
+            <a:picLocks noChangeAspect="1"/>
+          </p:cNvPicPr>
+          <p:nvPr/>
+        </p:nvPicPr>
+        <p:blipFill>
+          <a:blip r:embed="rId2"/>
+          <a:stretch>
+            <a:fillRect/>
+          </a:stretch>
+        </p:blipFill>
+        <p:spPr>
+          <a:xfrm>
+            <a:off x="11268" y="0"/>
+            <a:ext cx="12169464" cy="6858000"/>
+          </a:xfrm>
+          <a:prstGeom prst="rect">
+            <a:avLst/>
+          </a:prstGeom>
+        </p:spPr>
+      </p:pic>
+    </p:spTree>
+    <p:extLst>
+      <p:ext uri="{BB962C8B-B14F-4D97-AF65-F5344CB8AC3E}">
+        <p14:creationId xmlns:p14="http://schemas.microsoft.com/office/powerpoint/2010/main" val="1520235113"/>
+      </p:ext>
+    </p:extLst>
+  </p:cSld>
+  <p:clrMapOvr>
+    <a:masterClrMapping/>
+  </p:clrMapOvr>
+</p:sld>
+</file>
+
+<file path=ppt/slides/slide34.xml><?xml version="1.0" encoding="utf-8"?>
+<p:sld xmlns:a="http://schemas.openxmlformats.org/drawingml/2006/main" xmlns:r="http://schemas.openxmlformats.org/officeDocument/2006/relationships" xmlns:p="http://schemas.openxmlformats.org/presentationml/2006/main">
+  <p:cSld>
+    <p:spTree>
+      <p:nvGrpSpPr>
+        <p:cNvPr id="1" name=""/>
+        <p:cNvGrpSpPr/>
+        <p:nvPr/>
+      </p:nvGrpSpPr>
+      <p:grpSpPr>
+        <a:xfrm>
+          <a:off x="0" y="0"/>
+          <a:ext cx="0" cy="0"/>
+          <a:chOff x="0" y="0"/>
+          <a:chExt cx="0" cy="0"/>
+        </a:xfrm>
+      </p:grpSpPr>
+      <p:sp>
+        <p:nvSpPr>
+          <p:cNvPr id="2" name="Title 1">
+            <a:extLst>
+              <a:ext uri="{FF2B5EF4-FFF2-40B4-BE49-F238E27FC236}">
+                <a16:creationId xmlns:a16="http://schemas.microsoft.com/office/drawing/2014/main" id="{A841C99D-076D-CD43-8429-B7BC92D507AE}"/>
+              </a:ext>
+            </a:extLst>
+          </p:cNvPr>
+          <p:cNvSpPr>
+            <a:spLocks noGrp="1"/>
+          </p:cNvSpPr>
+          <p:nvPr>
+            <p:ph type="title"/>
+          </p:nvPr>
+        </p:nvSpPr>
+        <p:spPr/>
+        <p:txBody>
+          <a:bodyPr/>
+          <a:lstStyle/>
+          <a:p>
+            <a:r>
+              <a:rPr lang="en-US" dirty="0"/>
+              <a:t>Why do we care about containers?</a:t>
+            </a:r>
+          </a:p>
+        </p:txBody>
+      </p:sp>
+      <p:sp>
+        <p:nvSpPr>
+          <p:cNvPr id="3" name="Content Placeholder 2">
+            <a:extLst>
+              <a:ext uri="{FF2B5EF4-FFF2-40B4-BE49-F238E27FC236}">
+                <a16:creationId xmlns:a16="http://schemas.microsoft.com/office/drawing/2014/main" id="{823C2CA1-0AFC-4B42-AB32-C48C4765CCDC}"/>
+              </a:ext>
+            </a:extLst>
+          </p:cNvPr>
+          <p:cNvSpPr>
+            <a:spLocks noGrp="1"/>
+          </p:cNvSpPr>
+          <p:nvPr>
+            <p:ph idx="1"/>
+          </p:nvPr>
+        </p:nvSpPr>
+        <p:spPr/>
+        <p:txBody>
+          <a:bodyPr/>
+          <a:lstStyle/>
+          <a:p>
+            <a:r>
+              <a:rPr lang="en-US" dirty="0"/>
+              <a:t>We can do everything that containers can do without them?</a:t>
+            </a:r>
+          </a:p>
+          <a:p>
+            <a:r>
+              <a:rPr lang="en-US" dirty="0"/>
+              <a:t>Why we cannot continue doing things in the same way?</a:t>
+            </a:r>
+          </a:p>
+          <a:p>
+            <a:r>
+              <a:rPr lang="en-US" dirty="0"/>
+              <a:t>Why do we need another layer?</a:t>
+            </a:r>
+          </a:p>
+          <a:p>
+            <a:r>
+              <a:rPr lang="en-US" dirty="0"/>
+              <a:t>Why…why…why???</a:t>
+            </a:r>
+          </a:p>
+        </p:txBody>
+      </p:sp>
+    </p:spTree>
+    <p:extLst>
+      <p:ext uri="{BB962C8B-B14F-4D97-AF65-F5344CB8AC3E}">
+        <p14:creationId xmlns:p14="http://schemas.microsoft.com/office/powerpoint/2010/main" val="243511783"/>
+      </p:ext>
+    </p:extLst>
+  </p:cSld>
+  <p:clrMapOvr>
+    <a:masterClrMapping/>
+  </p:clrMapOvr>
+</p:sld>
+</file>
+
+<file path=ppt/slides/slide35.xml><?xml version="1.0" encoding="utf-8"?>
+<p:sld xmlns:a="http://schemas.openxmlformats.org/drawingml/2006/main" xmlns:r="http://schemas.openxmlformats.org/officeDocument/2006/relationships" xmlns:p="http://schemas.openxmlformats.org/presentationml/2006/main">
+  <p:cSld>
+    <p:spTree>
+      <p:nvGrpSpPr>
+        <p:cNvPr id="1" name=""/>
+        <p:cNvGrpSpPr/>
+        <p:nvPr/>
+      </p:nvGrpSpPr>
+      <p:grpSpPr>
+        <a:xfrm>
+          <a:off x="0" y="0"/>
+          <a:ext cx="0" cy="0"/>
+          <a:chOff x="0" y="0"/>
+          <a:chExt cx="0" cy="0"/>
+        </a:xfrm>
+      </p:grpSpPr>
+      <p:sp>
+        <p:nvSpPr>
+          <p:cNvPr id="2" name="Title 1">
+            <a:extLst>
+              <a:ext uri="{FF2B5EF4-FFF2-40B4-BE49-F238E27FC236}">
+                <a16:creationId xmlns:a16="http://schemas.microsoft.com/office/drawing/2014/main" id="{051F0C05-36BE-1443-A043-54691D12F4C5}"/>
+              </a:ext>
+            </a:extLst>
+          </p:cNvPr>
+          <p:cNvSpPr>
+            <a:spLocks noGrp="1"/>
+          </p:cNvSpPr>
+          <p:nvPr>
+            <p:ph type="title"/>
+          </p:nvPr>
+        </p:nvSpPr>
+        <p:spPr/>
+        <p:txBody>
+          <a:bodyPr/>
+          <a:lstStyle/>
+          <a:p>
+            <a:r>
+              <a:rPr lang="en-US" dirty="0"/>
+              <a:t>Developers love containers</a:t>
+            </a:r>
+          </a:p>
+        </p:txBody>
+      </p:sp>
+      <p:pic>
+        <p:nvPicPr>
+          <p:cNvPr id="9" name="Content Placeholder 8">
+            <a:extLst>
+              <a:ext uri="{FF2B5EF4-FFF2-40B4-BE49-F238E27FC236}">
+                <a16:creationId xmlns:a16="http://schemas.microsoft.com/office/drawing/2014/main" id="{281068DC-0728-734D-909D-B533AF08B8A6}"/>
+              </a:ext>
+            </a:extLst>
+          </p:cNvPr>
+          <p:cNvPicPr>
+            <a:picLocks noGrp="1" noChangeAspect="1"/>
+          </p:cNvPicPr>
+          <p:nvPr>
+            <p:ph idx="1"/>
+          </p:nvPr>
+        </p:nvPicPr>
+        <p:blipFill>
+          <a:blip r:embed="rId2"/>
+          <a:stretch>
+            <a:fillRect/>
+          </a:stretch>
+        </p:blipFill>
+        <p:spPr>
+          <a:xfrm>
+            <a:off x="838200" y="2291909"/>
+            <a:ext cx="10515600" cy="3418770"/>
+          </a:xfrm>
+        </p:spPr>
+      </p:pic>
+      <p:sp>
+        <p:nvSpPr>
+          <p:cNvPr id="10" name="Left Arrow 9">
+            <a:extLst>
+              <a:ext uri="{FF2B5EF4-FFF2-40B4-BE49-F238E27FC236}">
+                <a16:creationId xmlns:a16="http://schemas.microsoft.com/office/drawing/2014/main" id="{0876F2F8-5BCE-AC41-87F0-1D275B69F53C}"/>
+              </a:ext>
+            </a:extLst>
+          </p:cNvPr>
+          <p:cNvSpPr/>
+          <p:nvPr/>
+        </p:nvSpPr>
+        <p:spPr>
+          <a:xfrm>
+            <a:off x="2500313" y="4729163"/>
+            <a:ext cx="978408" cy="484632"/>
+          </a:xfrm>
+          <a:prstGeom prst="leftArrow">
+            <a:avLst/>
+          </a:prstGeom>
+        </p:spPr>
+        <p:style>
+          <a:lnRef idx="2">
+            <a:schemeClr val="accent1">
+              <a:shade val="50000"/>
+            </a:schemeClr>
+          </a:lnRef>
+          <a:fillRef idx="1">
+            <a:schemeClr val="accent1"/>
+          </a:fillRef>
+          <a:effectRef idx="0">
+            <a:schemeClr val="accent1"/>
+          </a:effectRef>
+          <a:fontRef idx="minor">
+            <a:schemeClr val="lt1"/>
+          </a:fontRef>
+        </p:style>
+        <p:txBody>
+          <a:bodyPr rtlCol="0" anchor="ctr"/>
+          <a:lstStyle/>
+          <a:p>
+            <a:pPr algn="ctr"/>
+            <a:endParaRPr lang="en-US"/>
+          </a:p>
+        </p:txBody>
+      </p:sp>
+    </p:spTree>
+    <p:extLst>
+      <p:ext uri="{BB962C8B-B14F-4D97-AF65-F5344CB8AC3E}">
+        <p14:creationId xmlns:p14="http://schemas.microsoft.com/office/powerpoint/2010/main" val="665710916"/>
       </p:ext>
     </p:extLst>
   </p:cSld>

</xml_diff>